<commit_message>
Adding arrow from QCD sidebands to QCD multijet background box, which then has an arrow pointing to the signal region to make things more obvious
</commit_message>
<xml_diff>
--- a/chapters/higgstoinv/figures/fit_overview.pptx
+++ b/chapters/higgstoinv/figures/fit_overview.pptx
@@ -6,6 +6,7 @@
   </p:sldMasterIdLst>
   <p:sldIdLst>
     <p:sldId id="256" r:id="rId2"/>
+    <p:sldId id="257" r:id="rId3"/>
   </p:sldIdLst>
   <p:sldSz cx="12192000" cy="6858000"/>
   <p:notesSz cx="6858000" cy="9144000"/>
@@ -104,6 +105,11 @@
       </a:defRPr>
     </a:lvl9pPr>
   </p:defaultTextStyle>
+  <p:extLst>
+    <p:ext uri="{EFAFB233-063F-42B5-8137-9DF3F51BA10A}">
+      <p15:sldGuideLst xmlns:p15="http://schemas.microsoft.com/office/powerpoint/2012/main"/>
+    </p:ext>
+  </p:extLst>
 </p:presentation>
 </file>
 
@@ -256,7 +262,7 @@
           <a:p>
             <a:fld id="{4E9B3BD9-5FA9-634B-B9CC-896E9BF9BE03}" type="datetimeFigureOut">
               <a:rPr lang="en-US" smtClean="0"/>
-              <a:t>5/24/20</a:t>
+              <a:t>11/23/20</a:t>
             </a:fld>
             <a:endParaRPr lang="en-US"/>
           </a:p>
@@ -456,7 +462,7 @@
           <a:p>
             <a:fld id="{4E9B3BD9-5FA9-634B-B9CC-896E9BF9BE03}" type="datetimeFigureOut">
               <a:rPr lang="en-US" smtClean="0"/>
-              <a:t>5/24/20</a:t>
+              <a:t>11/23/20</a:t>
             </a:fld>
             <a:endParaRPr lang="en-US"/>
           </a:p>
@@ -666,7 +672,7 @@
           <a:p>
             <a:fld id="{4E9B3BD9-5FA9-634B-B9CC-896E9BF9BE03}" type="datetimeFigureOut">
               <a:rPr lang="en-US" smtClean="0"/>
-              <a:t>5/24/20</a:t>
+              <a:t>11/23/20</a:t>
             </a:fld>
             <a:endParaRPr lang="en-US"/>
           </a:p>
@@ -866,7 +872,7 @@
           <a:p>
             <a:fld id="{4E9B3BD9-5FA9-634B-B9CC-896E9BF9BE03}" type="datetimeFigureOut">
               <a:rPr lang="en-US" smtClean="0"/>
-              <a:t>5/24/20</a:t>
+              <a:t>11/23/20</a:t>
             </a:fld>
             <a:endParaRPr lang="en-US"/>
           </a:p>
@@ -1142,7 +1148,7 @@
           <a:p>
             <a:fld id="{4E9B3BD9-5FA9-634B-B9CC-896E9BF9BE03}" type="datetimeFigureOut">
               <a:rPr lang="en-US" smtClean="0"/>
-              <a:t>5/24/20</a:t>
+              <a:t>11/23/20</a:t>
             </a:fld>
             <a:endParaRPr lang="en-US"/>
           </a:p>
@@ -1410,7 +1416,7 @@
           <a:p>
             <a:fld id="{4E9B3BD9-5FA9-634B-B9CC-896E9BF9BE03}" type="datetimeFigureOut">
               <a:rPr lang="en-US" smtClean="0"/>
-              <a:t>5/24/20</a:t>
+              <a:t>11/23/20</a:t>
             </a:fld>
             <a:endParaRPr lang="en-US"/>
           </a:p>
@@ -1825,7 +1831,7 @@
           <a:p>
             <a:fld id="{4E9B3BD9-5FA9-634B-B9CC-896E9BF9BE03}" type="datetimeFigureOut">
               <a:rPr lang="en-US" smtClean="0"/>
-              <a:t>5/24/20</a:t>
+              <a:t>11/23/20</a:t>
             </a:fld>
             <a:endParaRPr lang="en-US"/>
           </a:p>
@@ -1967,7 +1973,7 @@
           <a:p>
             <a:fld id="{4E9B3BD9-5FA9-634B-B9CC-896E9BF9BE03}" type="datetimeFigureOut">
               <a:rPr lang="en-US" smtClean="0"/>
-              <a:t>5/24/20</a:t>
+              <a:t>11/23/20</a:t>
             </a:fld>
             <a:endParaRPr lang="en-US"/>
           </a:p>
@@ -2080,7 +2086,7 @@
           <a:p>
             <a:fld id="{4E9B3BD9-5FA9-634B-B9CC-896E9BF9BE03}" type="datetimeFigureOut">
               <a:rPr lang="en-US" smtClean="0"/>
-              <a:t>5/24/20</a:t>
+              <a:t>11/23/20</a:t>
             </a:fld>
             <a:endParaRPr lang="en-US"/>
           </a:p>
@@ -2393,7 +2399,7 @@
           <a:p>
             <a:fld id="{4E9B3BD9-5FA9-634B-B9CC-896E9BF9BE03}" type="datetimeFigureOut">
               <a:rPr lang="en-US" smtClean="0"/>
-              <a:t>5/24/20</a:t>
+              <a:t>11/23/20</a:t>
             </a:fld>
             <a:endParaRPr lang="en-US"/>
           </a:p>
@@ -2682,7 +2688,7 @@
           <a:p>
             <a:fld id="{4E9B3BD9-5FA9-634B-B9CC-896E9BF9BE03}" type="datetimeFigureOut">
               <a:rPr lang="en-US" smtClean="0"/>
-              <a:t>5/24/20</a:t>
+              <a:t>11/23/20</a:t>
             </a:fld>
             <a:endParaRPr lang="en-US"/>
           </a:p>
@@ -2925,7 +2931,7 @@
           <a:p>
             <a:fld id="{4E9B3BD9-5FA9-634B-B9CC-896E9BF9BE03}" type="datetimeFigureOut">
               <a:rPr lang="en-US" smtClean="0"/>
-              <a:t>5/24/20</a:t>
+              <a:t>11/23/20</a:t>
             </a:fld>
             <a:endParaRPr lang="en-US"/>
           </a:p>
@@ -3417,6 +3423,2137 @@
             </a:p>
           </p:txBody>
         </p:sp>
+        <mc:AlternateContent xmlns:mc="http://schemas.openxmlformats.org/markup-compatibility/2006" xmlns:a14="http://schemas.microsoft.com/office/drawing/2010/main">
+          <mc:Choice Requires="a14">
+            <p:sp>
+              <p:nvSpPr>
+                <p:cNvPr id="10" name="TextBox 9">
+                  <a:extLst>
+                    <a:ext uri="{FF2B5EF4-FFF2-40B4-BE49-F238E27FC236}">
+                      <a16:creationId xmlns:a16="http://schemas.microsoft.com/office/drawing/2014/main" id="{18F2E7AE-41A2-3C49-876C-9517EC983D44}"/>
+                    </a:ext>
+                  </a:extLst>
+                </p:cNvPr>
+                <p:cNvSpPr txBox="1"/>
+                <p:nvPr/>
+              </p:nvSpPr>
+              <p:spPr>
+                <a:xfrm>
+                  <a:off x="3956958" y="1189947"/>
+                  <a:ext cx="1066800" cy="707886"/>
+                </a:xfrm>
+                <a:prstGeom prst="rect">
+                  <a:avLst/>
+                </a:prstGeom>
+                <a:noFill/>
+              </p:spPr>
+              <p:txBody>
+                <a:bodyPr wrap="square" rtlCol="0">
+                  <a:spAutoFit/>
+                </a:bodyPr>
+                <a:lstStyle/>
+                <a:p>
+                  <a:pPr algn="ctr"/>
+                  <a14:m>
+                    <m:oMath xmlns:m="http://schemas.openxmlformats.org/officeDocument/2006/math">
+                      <m:r>
+                        <a:rPr lang="en-US" sz="2000" i="1" smtClean="0">
+                          <a:latin typeface="Cambria Math" panose="02040503050406030204" pitchFamily="18" charset="0"/>
+                          <a:ea typeface="Cambria Math" panose="02040503050406030204" pitchFamily="18" charset="0"/>
+                        </a:rPr>
+                        <m:t>𝜇</m:t>
+                      </m:r>
+                      <m:r>
+                        <a:rPr lang="en-GB" sz="2000" b="0" i="1" smtClean="0">
+                          <a:latin typeface="Cambria Math" panose="02040503050406030204" pitchFamily="18" charset="0"/>
+                          <a:ea typeface="Cambria Math" panose="02040503050406030204" pitchFamily="18" charset="0"/>
+                        </a:rPr>
+                        <m:t>+</m:t>
+                      </m:r>
+                    </m:oMath>
+                  </a14:m>
+                  <a:r>
+                    <a:rPr lang="en-US" sz="2000" dirty="0">
+                      <a:latin typeface="Source Sans Pro" panose="020F0502020204030204" pitchFamily="34" charset="0"/>
+                      <a:ea typeface="Source Sans Pro" panose="020F0502020204030204" pitchFamily="34" charset="0"/>
+                    </a:rPr>
+                    <a:t> jets CR</a:t>
+                  </a:r>
+                </a:p>
+              </p:txBody>
+            </p:sp>
+          </mc:Choice>
+          <mc:Fallback xmlns="">
+            <p:sp>
+              <p:nvSpPr>
+                <p:cNvPr id="10" name="TextBox 9">
+                  <a:extLst>
+                    <a:ext uri="{FF2B5EF4-FFF2-40B4-BE49-F238E27FC236}">
+                      <a16:creationId xmlns:a16="http://schemas.microsoft.com/office/drawing/2014/main" id="{18F2E7AE-41A2-3C49-876C-9517EC983D44}"/>
+                    </a:ext>
+                  </a:extLst>
+                </p:cNvPr>
+                <p:cNvSpPr txBox="1">
+                  <a:spLocks noRot="1" noChangeAspect="1" noMove="1" noResize="1" noEditPoints="1" noAdjustHandles="1" noChangeArrowheads="1" noChangeShapeType="1" noTextEdit="1"/>
+                </p:cNvSpPr>
+                <p:nvPr/>
+              </p:nvSpPr>
+              <p:spPr>
+                <a:xfrm>
+                  <a:off x="3956958" y="1189947"/>
+                  <a:ext cx="1066800" cy="707886"/>
+                </a:xfrm>
+                <a:prstGeom prst="rect">
+                  <a:avLst/>
+                </a:prstGeom>
+                <a:blipFill>
+                  <a:blip r:embed="rId2"/>
+                  <a:stretch>
+                    <a:fillRect t="-3509" r="-7143" b="-14035"/>
+                  </a:stretch>
+                </a:blipFill>
+              </p:spPr>
+              <p:txBody>
+                <a:bodyPr/>
+                <a:lstStyle/>
+                <a:p>
+                  <a:r>
+                    <a:rPr lang="en-US">
+                      <a:noFill/>
+                    </a:rPr>
+                    <a:t> </a:t>
+                  </a:r>
+                </a:p>
+              </p:txBody>
+            </p:sp>
+          </mc:Fallback>
+        </mc:AlternateContent>
+      </p:grpSp>
+      <p:grpSp>
+        <p:nvGrpSpPr>
+          <p:cNvPr id="13" name="Group 12">
+            <a:extLst>
+              <a:ext uri="{FF2B5EF4-FFF2-40B4-BE49-F238E27FC236}">
+                <a16:creationId xmlns:a16="http://schemas.microsoft.com/office/drawing/2014/main" id="{4C77FD5D-8550-2140-8498-DC5E855ABFD5}"/>
+              </a:ext>
+            </a:extLst>
+          </p:cNvPr>
+          <p:cNvGrpSpPr/>
+          <p:nvPr/>
+        </p:nvGrpSpPr>
+        <p:grpSpPr>
+          <a:xfrm>
+            <a:off x="6749143" y="123147"/>
+            <a:ext cx="1905000" cy="1066800"/>
+            <a:chOff x="6749143" y="979713"/>
+            <a:chExt cx="1905000" cy="1066800"/>
+          </a:xfrm>
+        </p:grpSpPr>
+        <p:sp>
+          <p:nvSpPr>
+            <p:cNvPr id="9" name="Oval 8">
+              <a:extLst>
+                <a:ext uri="{FF2B5EF4-FFF2-40B4-BE49-F238E27FC236}">
+                  <a16:creationId xmlns:a16="http://schemas.microsoft.com/office/drawing/2014/main" id="{7D1657EE-2BC1-7543-A849-AC27C9C15FEA}"/>
+                </a:ext>
+              </a:extLst>
+            </p:cNvPr>
+            <p:cNvSpPr/>
+            <p:nvPr/>
+          </p:nvSpPr>
+          <p:spPr>
+            <a:xfrm>
+              <a:off x="6749143" y="979713"/>
+              <a:ext cx="1905000" cy="1066800"/>
+            </a:xfrm>
+            <a:prstGeom prst="ellipse">
+              <a:avLst/>
+            </a:prstGeom>
+            <a:solidFill>
+              <a:schemeClr val="accent4">
+                <a:lumMod val="60000"/>
+                <a:lumOff val="40000"/>
+              </a:schemeClr>
+            </a:solidFill>
+            <a:ln>
+              <a:noFill/>
+            </a:ln>
+          </p:spPr>
+          <p:style>
+            <a:lnRef idx="2">
+              <a:schemeClr val="accent1">
+                <a:shade val="50000"/>
+              </a:schemeClr>
+            </a:lnRef>
+            <a:fillRef idx="1">
+              <a:schemeClr val="accent1"/>
+            </a:fillRef>
+            <a:effectRef idx="0">
+              <a:schemeClr val="accent1"/>
+            </a:effectRef>
+            <a:fontRef idx="minor">
+              <a:schemeClr val="lt1"/>
+            </a:fontRef>
+          </p:style>
+          <p:txBody>
+            <a:bodyPr rtlCol="0" anchor="ctr"/>
+            <a:lstStyle/>
+            <a:p>
+              <a:pPr algn="ctr"/>
+              <a:endParaRPr lang="en-US"/>
+            </a:p>
+          </p:txBody>
+        </p:sp>
+        <mc:AlternateContent xmlns:mc="http://schemas.openxmlformats.org/markup-compatibility/2006" xmlns:a14="http://schemas.microsoft.com/office/drawing/2010/main">
+          <mc:Choice Requires="a14">
+            <p:sp>
+              <p:nvSpPr>
+                <p:cNvPr id="11" name="TextBox 10">
+                  <a:extLst>
+                    <a:ext uri="{FF2B5EF4-FFF2-40B4-BE49-F238E27FC236}">
+                      <a16:creationId xmlns:a16="http://schemas.microsoft.com/office/drawing/2014/main" id="{A8186F41-E317-9742-B17F-A48728603671}"/>
+                    </a:ext>
+                  </a:extLst>
+                </p:cNvPr>
+                <p:cNvSpPr txBox="1"/>
+                <p:nvPr/>
+              </p:nvSpPr>
+              <p:spPr>
+                <a:xfrm>
+                  <a:off x="7111093" y="1189947"/>
+                  <a:ext cx="1181100" cy="707886"/>
+                </a:xfrm>
+                <a:prstGeom prst="rect">
+                  <a:avLst/>
+                </a:prstGeom>
+                <a:noFill/>
+                <a:ln>
+                  <a:noFill/>
+                </a:ln>
+              </p:spPr>
+              <p:txBody>
+                <a:bodyPr wrap="square" rtlCol="0">
+                  <a:spAutoFit/>
+                </a:bodyPr>
+                <a:lstStyle/>
+                <a:p>
+                  <a:pPr algn="ctr"/>
+                  <a14:m>
+                    <m:oMath xmlns:m="http://schemas.openxmlformats.org/officeDocument/2006/math">
+                      <m:r>
+                        <a:rPr lang="en-GB" sz="2000" b="0" i="1" smtClean="0">
+                          <a:latin typeface="Cambria Math" panose="02040503050406030204" pitchFamily="18" charset="0"/>
+                          <a:ea typeface="Cambria Math" panose="02040503050406030204" pitchFamily="18" charset="0"/>
+                        </a:rPr>
+                        <m:t>𝑒</m:t>
+                      </m:r>
+                      <m:r>
+                        <a:rPr lang="en-GB" sz="2000" b="0" i="1" smtClean="0">
+                          <a:latin typeface="Cambria Math" panose="02040503050406030204" pitchFamily="18" charset="0"/>
+                          <a:ea typeface="Cambria Math" panose="02040503050406030204" pitchFamily="18" charset="0"/>
+                        </a:rPr>
+                        <m:t>+</m:t>
+                      </m:r>
+                    </m:oMath>
+                  </a14:m>
+                  <a:r>
+                    <a:rPr lang="en-US" sz="2000" dirty="0">
+                      <a:latin typeface="Source Sans Pro" panose="020F0502020204030204" pitchFamily="34" charset="0"/>
+                      <a:ea typeface="Source Sans Pro" panose="020F0502020204030204" pitchFamily="34" charset="0"/>
+                    </a:rPr>
+                    <a:t> jets CR</a:t>
+                  </a:r>
+                </a:p>
+              </p:txBody>
+            </p:sp>
+          </mc:Choice>
+          <mc:Fallback xmlns="">
+            <p:sp>
+              <p:nvSpPr>
+                <p:cNvPr id="11" name="TextBox 10">
+                  <a:extLst>
+                    <a:ext uri="{FF2B5EF4-FFF2-40B4-BE49-F238E27FC236}">
+                      <a16:creationId xmlns:a16="http://schemas.microsoft.com/office/drawing/2014/main" id="{A8186F41-E317-9742-B17F-A48728603671}"/>
+                    </a:ext>
+                  </a:extLst>
+                </p:cNvPr>
+                <p:cNvSpPr txBox="1">
+                  <a:spLocks noRot="1" noChangeAspect="1" noMove="1" noResize="1" noEditPoints="1" noAdjustHandles="1" noChangeArrowheads="1" noChangeShapeType="1" noTextEdit="1"/>
+                </p:cNvSpPr>
+                <p:nvPr/>
+              </p:nvSpPr>
+              <p:spPr>
+                <a:xfrm>
+                  <a:off x="7111093" y="1189947"/>
+                  <a:ext cx="1181100" cy="707886"/>
+                </a:xfrm>
+                <a:prstGeom prst="rect">
+                  <a:avLst/>
+                </a:prstGeom>
+                <a:blipFill>
+                  <a:blip r:embed="rId3"/>
+                  <a:stretch>
+                    <a:fillRect t="-3509" r="-1064" b="-14035"/>
+                  </a:stretch>
+                </a:blipFill>
+                <a:ln>
+                  <a:noFill/>
+                </a:ln>
+              </p:spPr>
+              <p:txBody>
+                <a:bodyPr/>
+                <a:lstStyle/>
+                <a:p>
+                  <a:r>
+                    <a:rPr lang="en-US">
+                      <a:noFill/>
+                    </a:rPr>
+                    <a:t> </a:t>
+                  </a:r>
+                </a:p>
+              </p:txBody>
+            </p:sp>
+          </mc:Fallback>
+        </mc:AlternateContent>
+      </p:grpSp>
+      <p:grpSp>
+        <p:nvGrpSpPr>
+          <p:cNvPr id="14" name="Group 13">
+            <a:extLst>
+              <a:ext uri="{FF2B5EF4-FFF2-40B4-BE49-F238E27FC236}">
+                <a16:creationId xmlns:a16="http://schemas.microsoft.com/office/drawing/2014/main" id="{858DBFF6-5D9E-374F-B3E9-E0EA58873734}"/>
+              </a:ext>
+            </a:extLst>
+          </p:cNvPr>
+          <p:cNvGrpSpPr/>
+          <p:nvPr/>
+        </p:nvGrpSpPr>
+        <p:grpSpPr>
+          <a:xfrm>
+            <a:off x="3004458" y="5668053"/>
+            <a:ext cx="1905000" cy="1066800"/>
+            <a:chOff x="3537858" y="979713"/>
+            <a:chExt cx="1905000" cy="1066800"/>
+          </a:xfrm>
+        </p:grpSpPr>
+        <p:sp>
+          <p:nvSpPr>
+            <p:cNvPr id="15" name="Oval 14">
+              <a:extLst>
+                <a:ext uri="{FF2B5EF4-FFF2-40B4-BE49-F238E27FC236}">
+                  <a16:creationId xmlns:a16="http://schemas.microsoft.com/office/drawing/2014/main" id="{7732E6AD-28F5-4A44-A7F9-AEC657EF17FC}"/>
+                </a:ext>
+              </a:extLst>
+            </p:cNvPr>
+            <p:cNvSpPr/>
+            <p:nvPr/>
+          </p:nvSpPr>
+          <p:spPr>
+            <a:xfrm>
+              <a:off x="3537858" y="979713"/>
+              <a:ext cx="1905000" cy="1066800"/>
+            </a:xfrm>
+            <a:prstGeom prst="ellipse">
+              <a:avLst/>
+            </a:prstGeom>
+            <a:solidFill>
+              <a:schemeClr val="accent2">
+                <a:lumMod val="60000"/>
+                <a:lumOff val="40000"/>
+              </a:schemeClr>
+            </a:solidFill>
+            <a:ln>
+              <a:noFill/>
+            </a:ln>
+          </p:spPr>
+          <p:style>
+            <a:lnRef idx="2">
+              <a:schemeClr val="accent1">
+                <a:shade val="50000"/>
+              </a:schemeClr>
+            </a:lnRef>
+            <a:fillRef idx="1">
+              <a:schemeClr val="accent1"/>
+            </a:fillRef>
+            <a:effectRef idx="0">
+              <a:schemeClr val="accent1"/>
+            </a:effectRef>
+            <a:fontRef idx="minor">
+              <a:schemeClr val="lt1"/>
+            </a:fontRef>
+          </p:style>
+          <p:txBody>
+            <a:bodyPr rtlCol="0" anchor="ctr"/>
+            <a:lstStyle/>
+            <a:p>
+              <a:pPr algn="ctr"/>
+              <a:endParaRPr lang="en-US"/>
+            </a:p>
+          </p:txBody>
+        </p:sp>
+        <mc:AlternateContent xmlns:mc="http://schemas.openxmlformats.org/markup-compatibility/2006" xmlns:a14="http://schemas.microsoft.com/office/drawing/2010/main">
+          <mc:Choice Requires="a14">
+            <p:sp>
+              <p:nvSpPr>
+                <p:cNvPr id="16" name="TextBox 15">
+                  <a:extLst>
+                    <a:ext uri="{FF2B5EF4-FFF2-40B4-BE49-F238E27FC236}">
+                      <a16:creationId xmlns:a16="http://schemas.microsoft.com/office/drawing/2014/main" id="{B642F606-834F-AF44-8975-9725542BEC04}"/>
+                    </a:ext>
+                  </a:extLst>
+                </p:cNvPr>
+                <p:cNvSpPr txBox="1"/>
+                <p:nvPr/>
+              </p:nvSpPr>
+              <p:spPr>
+                <a:xfrm>
+                  <a:off x="3878037" y="1189947"/>
+                  <a:ext cx="1224642" cy="707886"/>
+                </a:xfrm>
+                <a:prstGeom prst="rect">
+                  <a:avLst/>
+                </a:prstGeom>
+                <a:noFill/>
+              </p:spPr>
+              <p:txBody>
+                <a:bodyPr wrap="square" rtlCol="0">
+                  <a:spAutoFit/>
+                </a:bodyPr>
+                <a:lstStyle/>
+                <a:p>
+                  <a:pPr algn="ctr"/>
+                  <a14:m>
+                    <m:oMath xmlns:m="http://schemas.openxmlformats.org/officeDocument/2006/math">
+                      <m:r>
+                        <a:rPr lang="en-US" sz="2000" i="1" smtClean="0">
+                          <a:latin typeface="Cambria Math" panose="02040503050406030204" pitchFamily="18" charset="0"/>
+                          <a:ea typeface="Cambria Math" panose="02040503050406030204" pitchFamily="18" charset="0"/>
+                        </a:rPr>
+                        <m:t>𝜇𝜇</m:t>
+                      </m:r>
+                      <m:r>
+                        <a:rPr lang="en-GB" sz="2000" b="0" i="1" smtClean="0">
+                          <a:latin typeface="Cambria Math" panose="02040503050406030204" pitchFamily="18" charset="0"/>
+                          <a:ea typeface="Cambria Math" panose="02040503050406030204" pitchFamily="18" charset="0"/>
+                        </a:rPr>
+                        <m:t>+</m:t>
+                      </m:r>
+                    </m:oMath>
+                  </a14:m>
+                  <a:r>
+                    <a:rPr lang="en-US" sz="2000" dirty="0">
+                      <a:latin typeface="Source Sans Pro" panose="020F0502020204030204" pitchFamily="34" charset="0"/>
+                      <a:ea typeface="Source Sans Pro" panose="020F0502020204030204" pitchFamily="34" charset="0"/>
+                    </a:rPr>
+                    <a:t> jets CR</a:t>
+                  </a:r>
+                </a:p>
+              </p:txBody>
+            </p:sp>
+          </mc:Choice>
+          <mc:Fallback xmlns="">
+            <p:sp>
+              <p:nvSpPr>
+                <p:cNvPr id="16" name="TextBox 15">
+                  <a:extLst>
+                    <a:ext uri="{FF2B5EF4-FFF2-40B4-BE49-F238E27FC236}">
+                      <a16:creationId xmlns:a16="http://schemas.microsoft.com/office/drawing/2014/main" id="{B642F606-834F-AF44-8975-9725542BEC04}"/>
+                    </a:ext>
+                  </a:extLst>
+                </p:cNvPr>
+                <p:cNvSpPr txBox="1">
+                  <a:spLocks noRot="1" noChangeAspect="1" noMove="1" noResize="1" noEditPoints="1" noAdjustHandles="1" noChangeArrowheads="1" noChangeShapeType="1" noTextEdit="1"/>
+                </p:cNvSpPr>
+                <p:nvPr/>
+              </p:nvSpPr>
+              <p:spPr>
+                <a:xfrm>
+                  <a:off x="3878037" y="1189947"/>
+                  <a:ext cx="1224642" cy="707886"/>
+                </a:xfrm>
+                <a:prstGeom prst="rect">
+                  <a:avLst/>
+                </a:prstGeom>
+                <a:blipFill>
+                  <a:blip r:embed="rId4"/>
+                  <a:stretch>
+                    <a:fillRect t="-3509" r="-5102" b="-12281"/>
+                  </a:stretch>
+                </a:blipFill>
+              </p:spPr>
+              <p:txBody>
+                <a:bodyPr/>
+                <a:lstStyle/>
+                <a:p>
+                  <a:r>
+                    <a:rPr lang="en-US">
+                      <a:noFill/>
+                    </a:rPr>
+                    <a:t> </a:t>
+                  </a:r>
+                </a:p>
+              </p:txBody>
+            </p:sp>
+          </mc:Fallback>
+        </mc:AlternateContent>
+      </p:grpSp>
+      <p:grpSp>
+        <p:nvGrpSpPr>
+          <p:cNvPr id="17" name="Group 16">
+            <a:extLst>
+              <a:ext uri="{FF2B5EF4-FFF2-40B4-BE49-F238E27FC236}">
+                <a16:creationId xmlns:a16="http://schemas.microsoft.com/office/drawing/2014/main" id="{8589102A-87C3-A541-AAE1-D80E958AE5DB}"/>
+              </a:ext>
+            </a:extLst>
+          </p:cNvPr>
+          <p:cNvGrpSpPr/>
+          <p:nvPr/>
+        </p:nvGrpSpPr>
+        <p:grpSpPr>
+          <a:xfrm>
+            <a:off x="7339693" y="5668053"/>
+            <a:ext cx="1905000" cy="1066800"/>
+            <a:chOff x="6749143" y="979713"/>
+            <a:chExt cx="1905000" cy="1066800"/>
+          </a:xfrm>
+        </p:grpSpPr>
+        <p:sp>
+          <p:nvSpPr>
+            <p:cNvPr id="18" name="Oval 17">
+              <a:extLst>
+                <a:ext uri="{FF2B5EF4-FFF2-40B4-BE49-F238E27FC236}">
+                  <a16:creationId xmlns:a16="http://schemas.microsoft.com/office/drawing/2014/main" id="{9F47D998-9A0F-DC4D-8544-491FA75BCBDA}"/>
+                </a:ext>
+              </a:extLst>
+            </p:cNvPr>
+            <p:cNvSpPr/>
+            <p:nvPr/>
+          </p:nvSpPr>
+          <p:spPr>
+            <a:xfrm>
+              <a:off x="6749143" y="979713"/>
+              <a:ext cx="1905000" cy="1066800"/>
+            </a:xfrm>
+            <a:prstGeom prst="ellipse">
+              <a:avLst/>
+            </a:prstGeom>
+            <a:solidFill>
+              <a:schemeClr val="accent2">
+                <a:lumMod val="60000"/>
+                <a:lumOff val="40000"/>
+              </a:schemeClr>
+            </a:solidFill>
+            <a:ln>
+              <a:noFill/>
+            </a:ln>
+          </p:spPr>
+          <p:style>
+            <a:lnRef idx="2">
+              <a:schemeClr val="accent1">
+                <a:shade val="50000"/>
+              </a:schemeClr>
+            </a:lnRef>
+            <a:fillRef idx="1">
+              <a:schemeClr val="accent1"/>
+            </a:fillRef>
+            <a:effectRef idx="0">
+              <a:schemeClr val="accent1"/>
+            </a:effectRef>
+            <a:fontRef idx="minor">
+              <a:schemeClr val="lt1"/>
+            </a:fontRef>
+          </p:style>
+          <p:txBody>
+            <a:bodyPr rtlCol="0" anchor="ctr"/>
+            <a:lstStyle/>
+            <a:p>
+              <a:pPr algn="ctr"/>
+              <a:endParaRPr lang="en-US" dirty="0"/>
+            </a:p>
+          </p:txBody>
+        </p:sp>
+        <mc:AlternateContent xmlns:mc="http://schemas.openxmlformats.org/markup-compatibility/2006" xmlns:a14="http://schemas.microsoft.com/office/drawing/2010/main">
+          <mc:Choice Requires="a14">
+            <p:sp>
+              <p:nvSpPr>
+                <p:cNvPr id="19" name="TextBox 18">
+                  <a:extLst>
+                    <a:ext uri="{FF2B5EF4-FFF2-40B4-BE49-F238E27FC236}">
+                      <a16:creationId xmlns:a16="http://schemas.microsoft.com/office/drawing/2014/main" id="{0EB41DBD-BA49-E84F-9A80-3A8D7EFDC10A}"/>
+                    </a:ext>
+                  </a:extLst>
+                </p:cNvPr>
+                <p:cNvSpPr txBox="1"/>
+                <p:nvPr/>
+              </p:nvSpPr>
+              <p:spPr>
+                <a:xfrm>
+                  <a:off x="7111093" y="1189947"/>
+                  <a:ext cx="1181100" cy="707886"/>
+                </a:xfrm>
+                <a:prstGeom prst="rect">
+                  <a:avLst/>
+                </a:prstGeom>
+                <a:noFill/>
+              </p:spPr>
+              <p:txBody>
+                <a:bodyPr wrap="square" rtlCol="0">
+                  <a:spAutoFit/>
+                </a:bodyPr>
+                <a:lstStyle/>
+                <a:p>
+                  <a:pPr algn="ctr"/>
+                  <a14:m>
+                    <m:oMath xmlns:m="http://schemas.openxmlformats.org/officeDocument/2006/math">
+                      <m:r>
+                        <a:rPr lang="en-GB" sz="2000" b="0" i="1" smtClean="0">
+                          <a:latin typeface="Cambria Math" panose="02040503050406030204" pitchFamily="18" charset="0"/>
+                          <a:ea typeface="Cambria Math" panose="02040503050406030204" pitchFamily="18" charset="0"/>
+                        </a:rPr>
+                        <m:t>𝑒𝑒</m:t>
+                      </m:r>
+                      <m:r>
+                        <a:rPr lang="en-GB" sz="2000" b="0" i="1" smtClean="0">
+                          <a:latin typeface="Cambria Math" panose="02040503050406030204" pitchFamily="18" charset="0"/>
+                          <a:ea typeface="Cambria Math" panose="02040503050406030204" pitchFamily="18" charset="0"/>
+                        </a:rPr>
+                        <m:t>+</m:t>
+                      </m:r>
+                    </m:oMath>
+                  </a14:m>
+                  <a:r>
+                    <a:rPr lang="en-US" sz="2000" dirty="0">
+                      <a:latin typeface="Source Sans Pro" panose="020F0502020204030204" pitchFamily="34" charset="0"/>
+                      <a:ea typeface="Source Sans Pro" panose="020F0502020204030204" pitchFamily="34" charset="0"/>
+                    </a:rPr>
+                    <a:t> jets CR</a:t>
+                  </a:r>
+                </a:p>
+              </p:txBody>
+            </p:sp>
+          </mc:Choice>
+          <mc:Fallback xmlns="">
+            <p:sp>
+              <p:nvSpPr>
+                <p:cNvPr id="19" name="TextBox 18">
+                  <a:extLst>
+                    <a:ext uri="{FF2B5EF4-FFF2-40B4-BE49-F238E27FC236}">
+                      <a16:creationId xmlns:a16="http://schemas.microsoft.com/office/drawing/2014/main" id="{0EB41DBD-BA49-E84F-9A80-3A8D7EFDC10A}"/>
+                    </a:ext>
+                  </a:extLst>
+                </p:cNvPr>
+                <p:cNvSpPr txBox="1">
+                  <a:spLocks noRot="1" noChangeAspect="1" noMove="1" noResize="1" noEditPoints="1" noAdjustHandles="1" noChangeArrowheads="1" noChangeShapeType="1" noTextEdit="1"/>
+                </p:cNvSpPr>
+                <p:nvPr/>
+              </p:nvSpPr>
+              <p:spPr>
+                <a:xfrm>
+                  <a:off x="7111093" y="1189947"/>
+                  <a:ext cx="1181100" cy="707886"/>
+                </a:xfrm>
+                <a:prstGeom prst="rect">
+                  <a:avLst/>
+                </a:prstGeom>
+                <a:blipFill>
+                  <a:blip r:embed="rId5"/>
+                  <a:stretch>
+                    <a:fillRect t="-3509" r="-7447" b="-12281"/>
+                  </a:stretch>
+                </a:blipFill>
+              </p:spPr>
+              <p:txBody>
+                <a:bodyPr/>
+                <a:lstStyle/>
+                <a:p>
+                  <a:r>
+                    <a:rPr lang="en-US">
+                      <a:noFill/>
+                    </a:rPr>
+                    <a:t> </a:t>
+                  </a:r>
+                </a:p>
+              </p:txBody>
+            </p:sp>
+          </mc:Fallback>
+        </mc:AlternateContent>
+      </p:grpSp>
+      <p:grpSp>
+        <p:nvGrpSpPr>
+          <p:cNvPr id="20" name="Group 19">
+            <a:extLst>
+              <a:ext uri="{FF2B5EF4-FFF2-40B4-BE49-F238E27FC236}">
+                <a16:creationId xmlns:a16="http://schemas.microsoft.com/office/drawing/2014/main" id="{FE563656-AE10-7F47-A465-E3DAB04A0914}"/>
+              </a:ext>
+            </a:extLst>
+          </p:cNvPr>
+          <p:cNvGrpSpPr/>
+          <p:nvPr/>
+        </p:nvGrpSpPr>
+        <p:grpSpPr>
+          <a:xfrm>
+            <a:off x="5143500" y="5668053"/>
+            <a:ext cx="1905000" cy="1066800"/>
+            <a:chOff x="3537858" y="979713"/>
+            <a:chExt cx="1905000" cy="1066800"/>
+          </a:xfrm>
+        </p:grpSpPr>
+        <p:sp>
+          <p:nvSpPr>
+            <p:cNvPr id="21" name="Oval 20">
+              <a:extLst>
+                <a:ext uri="{FF2B5EF4-FFF2-40B4-BE49-F238E27FC236}">
+                  <a16:creationId xmlns:a16="http://schemas.microsoft.com/office/drawing/2014/main" id="{0A1E1832-1421-9046-811B-A2D3A575CD50}"/>
+                </a:ext>
+              </a:extLst>
+            </p:cNvPr>
+            <p:cNvSpPr/>
+            <p:nvPr/>
+          </p:nvSpPr>
+          <p:spPr>
+            <a:xfrm>
+              <a:off x="3537858" y="979713"/>
+              <a:ext cx="1905000" cy="1066800"/>
+            </a:xfrm>
+            <a:prstGeom prst="ellipse">
+              <a:avLst/>
+            </a:prstGeom>
+            <a:solidFill>
+              <a:schemeClr val="accent2">
+                <a:lumMod val="60000"/>
+                <a:lumOff val="40000"/>
+              </a:schemeClr>
+            </a:solidFill>
+            <a:ln>
+              <a:noFill/>
+            </a:ln>
+          </p:spPr>
+          <p:style>
+            <a:lnRef idx="2">
+              <a:schemeClr val="accent1">
+                <a:shade val="50000"/>
+              </a:schemeClr>
+            </a:lnRef>
+            <a:fillRef idx="1">
+              <a:schemeClr val="accent1"/>
+            </a:fillRef>
+            <a:effectRef idx="0">
+              <a:schemeClr val="accent1"/>
+            </a:effectRef>
+            <a:fontRef idx="minor">
+              <a:schemeClr val="lt1"/>
+            </a:fontRef>
+          </p:style>
+          <p:txBody>
+            <a:bodyPr rtlCol="0" anchor="ctr"/>
+            <a:lstStyle/>
+            <a:p>
+              <a:pPr algn="ctr"/>
+              <a:endParaRPr lang="en-US" dirty="0"/>
+            </a:p>
+          </p:txBody>
+        </p:sp>
+        <mc:AlternateContent xmlns:mc="http://schemas.openxmlformats.org/markup-compatibility/2006" xmlns:a14="http://schemas.microsoft.com/office/drawing/2010/main">
+          <mc:Choice Requires="a14">
+            <p:sp>
+              <p:nvSpPr>
+                <p:cNvPr id="22" name="TextBox 21">
+                  <a:extLst>
+                    <a:ext uri="{FF2B5EF4-FFF2-40B4-BE49-F238E27FC236}">
+                      <a16:creationId xmlns:a16="http://schemas.microsoft.com/office/drawing/2014/main" id="{EBE8293A-A999-D248-84F8-2C6E39C06DCC}"/>
+                    </a:ext>
+                  </a:extLst>
+                </p:cNvPr>
+                <p:cNvSpPr txBox="1"/>
+                <p:nvPr/>
+              </p:nvSpPr>
+              <p:spPr>
+                <a:xfrm>
+                  <a:off x="3878037" y="1189947"/>
+                  <a:ext cx="1224642" cy="707886"/>
+                </a:xfrm>
+                <a:prstGeom prst="rect">
+                  <a:avLst/>
+                </a:prstGeom>
+                <a:noFill/>
+              </p:spPr>
+              <p:txBody>
+                <a:bodyPr wrap="square" rtlCol="0">
+                  <a:spAutoFit/>
+                </a:bodyPr>
+                <a:lstStyle/>
+                <a:p>
+                  <a:pPr algn="ctr"/>
+                  <a14:m>
+                    <m:oMath xmlns:m="http://schemas.openxmlformats.org/officeDocument/2006/math">
+                      <m:r>
+                        <a:rPr lang="en-GB" sz="2000" b="0" i="1" smtClean="0">
+                          <a:latin typeface="Cambria Math" panose="02040503050406030204" pitchFamily="18" charset="0"/>
+                          <a:ea typeface="Cambria Math" panose="02040503050406030204" pitchFamily="18" charset="0"/>
+                        </a:rPr>
+                        <m:t>𝛾</m:t>
+                      </m:r>
+                      <m:r>
+                        <a:rPr lang="en-GB" sz="2000" b="0" i="1" smtClean="0">
+                          <a:latin typeface="Cambria Math" panose="02040503050406030204" pitchFamily="18" charset="0"/>
+                          <a:ea typeface="Cambria Math" panose="02040503050406030204" pitchFamily="18" charset="0"/>
+                        </a:rPr>
+                        <m:t>+</m:t>
+                      </m:r>
+                    </m:oMath>
+                  </a14:m>
+                  <a:r>
+                    <a:rPr lang="en-US" sz="2000" dirty="0">
+                      <a:latin typeface="Source Sans Pro" panose="020F0502020204030204" pitchFamily="34" charset="0"/>
+                      <a:ea typeface="Source Sans Pro" panose="020F0502020204030204" pitchFamily="34" charset="0"/>
+                    </a:rPr>
+                    <a:t> jets CR</a:t>
+                  </a:r>
+                </a:p>
+              </p:txBody>
+            </p:sp>
+          </mc:Choice>
+          <mc:Fallback xmlns="">
+            <p:sp>
+              <p:nvSpPr>
+                <p:cNvPr id="22" name="TextBox 21">
+                  <a:extLst>
+                    <a:ext uri="{FF2B5EF4-FFF2-40B4-BE49-F238E27FC236}">
+                      <a16:creationId xmlns:a16="http://schemas.microsoft.com/office/drawing/2014/main" id="{EBE8293A-A999-D248-84F8-2C6E39C06DCC}"/>
+                    </a:ext>
+                  </a:extLst>
+                </p:cNvPr>
+                <p:cNvSpPr txBox="1">
+                  <a:spLocks noRot="1" noChangeAspect="1" noMove="1" noResize="1" noEditPoints="1" noAdjustHandles="1" noChangeArrowheads="1" noChangeShapeType="1" noTextEdit="1"/>
+                </p:cNvSpPr>
+                <p:nvPr/>
+              </p:nvSpPr>
+              <p:spPr>
+                <a:xfrm>
+                  <a:off x="3878037" y="1189947"/>
+                  <a:ext cx="1224642" cy="707886"/>
+                </a:xfrm>
+                <a:prstGeom prst="rect">
+                  <a:avLst/>
+                </a:prstGeom>
+                <a:blipFill>
+                  <a:blip r:embed="rId6"/>
+                  <a:stretch>
+                    <a:fillRect t="-3509" b="-12281"/>
+                  </a:stretch>
+                </a:blipFill>
+              </p:spPr>
+              <p:txBody>
+                <a:bodyPr/>
+                <a:lstStyle/>
+                <a:p>
+                  <a:r>
+                    <a:rPr lang="en-US">
+                      <a:noFill/>
+                    </a:rPr>
+                    <a:t> </a:t>
+                  </a:r>
+                </a:p>
+              </p:txBody>
+            </p:sp>
+          </mc:Fallback>
+        </mc:AlternateContent>
+      </p:grpSp>
+      <p:grpSp>
+        <p:nvGrpSpPr>
+          <p:cNvPr id="23" name="Group 22">
+            <a:extLst>
+              <a:ext uri="{FF2B5EF4-FFF2-40B4-BE49-F238E27FC236}">
+                <a16:creationId xmlns:a16="http://schemas.microsoft.com/office/drawing/2014/main" id="{05C64B10-0682-964E-9759-113F2F05380F}"/>
+              </a:ext>
+            </a:extLst>
+          </p:cNvPr>
+          <p:cNvGrpSpPr/>
+          <p:nvPr/>
+        </p:nvGrpSpPr>
+        <p:grpSpPr>
+          <a:xfrm>
+            <a:off x="2585358" y="2895600"/>
+            <a:ext cx="1905000" cy="1066800"/>
+            <a:chOff x="3537858" y="979713"/>
+            <a:chExt cx="1905000" cy="1066800"/>
+          </a:xfrm>
+        </p:grpSpPr>
+        <p:sp>
+          <p:nvSpPr>
+            <p:cNvPr id="24" name="Oval 23">
+              <a:extLst>
+                <a:ext uri="{FF2B5EF4-FFF2-40B4-BE49-F238E27FC236}">
+                  <a16:creationId xmlns:a16="http://schemas.microsoft.com/office/drawing/2014/main" id="{2023E30A-7264-9644-8CD6-63EC4A26A37F}"/>
+                </a:ext>
+              </a:extLst>
+            </p:cNvPr>
+            <p:cNvSpPr/>
+            <p:nvPr/>
+          </p:nvSpPr>
+          <p:spPr>
+            <a:xfrm>
+              <a:off x="3537858" y="979713"/>
+              <a:ext cx="1905000" cy="1066800"/>
+            </a:xfrm>
+            <a:prstGeom prst="ellipse">
+              <a:avLst/>
+            </a:prstGeom>
+            <a:solidFill>
+              <a:schemeClr val="accent6">
+                <a:lumMod val="60000"/>
+                <a:lumOff val="40000"/>
+              </a:schemeClr>
+            </a:solidFill>
+            <a:ln>
+              <a:noFill/>
+            </a:ln>
+          </p:spPr>
+          <p:style>
+            <a:lnRef idx="2">
+              <a:schemeClr val="accent1">
+                <a:shade val="50000"/>
+              </a:schemeClr>
+            </a:lnRef>
+            <a:fillRef idx="1">
+              <a:schemeClr val="accent1"/>
+            </a:fillRef>
+            <a:effectRef idx="0">
+              <a:schemeClr val="accent1"/>
+            </a:effectRef>
+            <a:fontRef idx="minor">
+              <a:schemeClr val="lt1"/>
+            </a:fontRef>
+          </p:style>
+          <p:txBody>
+            <a:bodyPr rtlCol="0" anchor="ctr"/>
+            <a:lstStyle/>
+            <a:p>
+              <a:pPr algn="ctr"/>
+              <a:endParaRPr lang="en-US"/>
+            </a:p>
+          </p:txBody>
+        </p:sp>
+        <p:sp>
+          <p:nvSpPr>
+            <p:cNvPr id="25" name="TextBox 24">
+              <a:extLst>
+                <a:ext uri="{FF2B5EF4-FFF2-40B4-BE49-F238E27FC236}">
+                  <a16:creationId xmlns:a16="http://schemas.microsoft.com/office/drawing/2014/main" id="{FA78E966-EE72-7B4D-B079-A3D81B5334C4}"/>
+                </a:ext>
+              </a:extLst>
+            </p:cNvPr>
+            <p:cNvSpPr txBox="1"/>
+            <p:nvPr/>
+          </p:nvSpPr>
+          <p:spPr>
+            <a:xfrm>
+              <a:off x="3837215" y="1159170"/>
+              <a:ext cx="1306285" cy="707886"/>
+            </a:xfrm>
+            <a:prstGeom prst="rect">
+              <a:avLst/>
+            </a:prstGeom>
+            <a:noFill/>
+          </p:spPr>
+          <p:txBody>
+            <a:bodyPr wrap="square" rtlCol="0">
+              <a:spAutoFit/>
+            </a:bodyPr>
+            <a:lstStyle/>
+            <a:p>
+              <a:pPr algn="ctr"/>
+              <a:r>
+                <a:rPr lang="en-US" sz="2000" dirty="0">
+                  <a:latin typeface="Source Sans Pro" panose="020F0502020204030204" pitchFamily="34" charset="0"/>
+                  <a:ea typeface="Source Sans Pro" panose="020F0502020204030204" pitchFamily="34" charset="0"/>
+                </a:rPr>
+                <a:t>QCD sidebands</a:t>
+              </a:r>
+            </a:p>
+          </p:txBody>
+        </p:sp>
+      </p:grpSp>
+      <p:grpSp>
+        <p:nvGrpSpPr>
+          <p:cNvPr id="28" name="Group 27">
+            <a:extLst>
+              <a:ext uri="{FF2B5EF4-FFF2-40B4-BE49-F238E27FC236}">
+                <a16:creationId xmlns:a16="http://schemas.microsoft.com/office/drawing/2014/main" id="{A510C7E4-C10C-524D-980B-AE66E489E872}"/>
+              </a:ext>
+            </a:extLst>
+          </p:cNvPr>
+          <p:cNvGrpSpPr/>
+          <p:nvPr/>
+        </p:nvGrpSpPr>
+        <p:grpSpPr>
+          <a:xfrm>
+            <a:off x="5143501" y="4539344"/>
+            <a:ext cx="1904999" cy="435428"/>
+            <a:chOff x="5143501" y="4474029"/>
+            <a:chExt cx="1904999" cy="435428"/>
+          </a:xfrm>
+        </p:grpSpPr>
+        <p:sp>
+          <p:nvSpPr>
+            <p:cNvPr id="26" name="Rectangle 25">
+              <a:extLst>
+                <a:ext uri="{FF2B5EF4-FFF2-40B4-BE49-F238E27FC236}">
+                  <a16:creationId xmlns:a16="http://schemas.microsoft.com/office/drawing/2014/main" id="{C6CE91DC-77D2-2948-89CA-1339D36ADD6A}"/>
+                </a:ext>
+              </a:extLst>
+            </p:cNvPr>
+            <p:cNvSpPr/>
+            <p:nvPr/>
+          </p:nvSpPr>
+          <p:spPr>
+            <a:xfrm>
+              <a:off x="5143501" y="4474029"/>
+              <a:ext cx="1904999" cy="435428"/>
+            </a:xfrm>
+            <a:prstGeom prst="rect">
+              <a:avLst/>
+            </a:prstGeom>
+            <a:solidFill>
+              <a:schemeClr val="accent2">
+                <a:lumMod val="40000"/>
+                <a:lumOff val="60000"/>
+              </a:schemeClr>
+            </a:solidFill>
+            <a:ln>
+              <a:noFill/>
+            </a:ln>
+          </p:spPr>
+          <p:style>
+            <a:lnRef idx="2">
+              <a:schemeClr val="accent1">
+                <a:shade val="50000"/>
+              </a:schemeClr>
+            </a:lnRef>
+            <a:fillRef idx="1">
+              <a:schemeClr val="accent1"/>
+            </a:fillRef>
+            <a:effectRef idx="0">
+              <a:schemeClr val="accent1"/>
+            </a:effectRef>
+            <a:fontRef idx="minor">
+              <a:schemeClr val="lt1"/>
+            </a:fontRef>
+          </p:style>
+          <p:txBody>
+            <a:bodyPr rtlCol="0" anchor="ctr"/>
+            <a:lstStyle/>
+            <a:p>
+              <a:pPr algn="ctr"/>
+              <a:endParaRPr lang="en-US"/>
+            </a:p>
+          </p:txBody>
+        </p:sp>
+        <mc:AlternateContent xmlns:mc="http://schemas.openxmlformats.org/markup-compatibility/2006" xmlns:a14="http://schemas.microsoft.com/office/drawing/2010/main">
+          <mc:Choice Requires="a14">
+            <p:sp>
+              <p:nvSpPr>
+                <p:cNvPr id="27" name="TextBox 26">
+                  <a:extLst>
+                    <a:ext uri="{FF2B5EF4-FFF2-40B4-BE49-F238E27FC236}">
+                      <a16:creationId xmlns:a16="http://schemas.microsoft.com/office/drawing/2014/main" id="{738524B7-A8B7-014F-9AEF-FEB201829D5F}"/>
+                    </a:ext>
+                  </a:extLst>
+                </p:cNvPr>
+                <p:cNvSpPr txBox="1"/>
+                <p:nvPr/>
+              </p:nvSpPr>
+              <p:spPr>
+                <a:xfrm>
+                  <a:off x="5206094" y="4474029"/>
+                  <a:ext cx="1798863" cy="400110"/>
+                </a:xfrm>
+                <a:prstGeom prst="rect">
+                  <a:avLst/>
+                </a:prstGeom>
+                <a:noFill/>
+              </p:spPr>
+              <p:txBody>
+                <a:bodyPr wrap="square" rtlCol="0">
+                  <a:spAutoFit/>
+                </a:bodyPr>
+                <a:lstStyle/>
+                <a:p>
+                  <a:pPr algn="ctr"/>
+                  <a14:m>
+                    <m:oMath xmlns:m="http://schemas.openxmlformats.org/officeDocument/2006/math">
+                      <m:r>
+                        <a:rPr lang="en-GB" sz="2000" b="0" i="1" smtClean="0">
+                          <a:latin typeface="Cambria Math" panose="02040503050406030204" pitchFamily="18" charset="0"/>
+                          <a:ea typeface="Source Sans Pro" panose="020F0502020204030204" pitchFamily="34" charset="0"/>
+                        </a:rPr>
+                        <m:t>𝑍</m:t>
+                      </m:r>
+                      <m:d>
+                        <m:dPr>
+                          <m:ctrlPr>
+                            <a:rPr lang="en-GB" sz="2000" b="0" i="1" smtClean="0">
+                              <a:latin typeface="Cambria Math" panose="02040503050406030204" pitchFamily="18" charset="0"/>
+                              <a:ea typeface="Source Sans Pro" panose="020F0502020204030204" pitchFamily="34" charset="0"/>
+                            </a:rPr>
+                          </m:ctrlPr>
+                        </m:dPr>
+                        <m:e>
+                          <m:r>
+                            <a:rPr lang="en-GB" sz="2000" b="0" i="1" smtClean="0">
+                              <a:latin typeface="Cambria Math" panose="02040503050406030204" pitchFamily="18" charset="0"/>
+                              <a:ea typeface="Cambria Math" panose="02040503050406030204" pitchFamily="18" charset="0"/>
+                            </a:rPr>
+                            <m:t>→</m:t>
+                          </m:r>
+                          <m:r>
+                            <a:rPr lang="en-GB" sz="2000" b="0" i="1" smtClean="0">
+                              <a:latin typeface="Cambria Math" panose="02040503050406030204" pitchFamily="18" charset="0"/>
+                              <a:ea typeface="Cambria Math" panose="02040503050406030204" pitchFamily="18" charset="0"/>
+                            </a:rPr>
+                            <m:t>𝜐𝜐</m:t>
+                          </m:r>
+                        </m:e>
+                      </m:d>
+                      <m:r>
+                        <a:rPr lang="en-GB" sz="2000" b="0" i="1" smtClean="0">
+                          <a:latin typeface="Cambria Math" panose="02040503050406030204" pitchFamily="18" charset="0"/>
+                          <a:ea typeface="Cambria Math" panose="02040503050406030204" pitchFamily="18" charset="0"/>
+                        </a:rPr>
+                        <m:t>+</m:t>
+                      </m:r>
+                    </m:oMath>
+                  </a14:m>
+                  <a:r>
+                    <a:rPr lang="en-US" sz="2000" dirty="0">
+                      <a:latin typeface="Source Sans Pro" panose="020F0502020204030204" pitchFamily="34" charset="0"/>
+                      <a:ea typeface="Source Sans Pro" panose="020F0502020204030204" pitchFamily="34" charset="0"/>
+                    </a:rPr>
+                    <a:t> jets</a:t>
+                  </a:r>
+                </a:p>
+              </p:txBody>
+            </p:sp>
+          </mc:Choice>
+          <mc:Fallback xmlns="">
+            <p:sp>
+              <p:nvSpPr>
+                <p:cNvPr id="27" name="TextBox 26">
+                  <a:extLst>
+                    <a:ext uri="{FF2B5EF4-FFF2-40B4-BE49-F238E27FC236}">
+                      <a16:creationId xmlns:a16="http://schemas.microsoft.com/office/drawing/2014/main" id="{738524B7-A8B7-014F-9AEF-FEB201829D5F}"/>
+                    </a:ext>
+                  </a:extLst>
+                </p:cNvPr>
+                <p:cNvSpPr txBox="1">
+                  <a:spLocks noRot="1" noChangeAspect="1" noMove="1" noResize="1" noEditPoints="1" noAdjustHandles="1" noChangeArrowheads="1" noChangeShapeType="1" noTextEdit="1"/>
+                </p:cNvSpPr>
+                <p:nvPr/>
+              </p:nvSpPr>
+              <p:spPr>
+                <a:xfrm>
+                  <a:off x="5206094" y="4474029"/>
+                  <a:ext cx="1798863" cy="400110"/>
+                </a:xfrm>
+                <a:prstGeom prst="rect">
+                  <a:avLst/>
+                </a:prstGeom>
+                <a:blipFill>
+                  <a:blip r:embed="rId7"/>
+                  <a:stretch>
+                    <a:fillRect t="-6061" r="-2098" b="-24242"/>
+                  </a:stretch>
+                </a:blipFill>
+              </p:spPr>
+              <p:txBody>
+                <a:bodyPr/>
+                <a:lstStyle/>
+                <a:p>
+                  <a:r>
+                    <a:rPr lang="en-US">
+                      <a:noFill/>
+                    </a:rPr>
+                    <a:t> </a:t>
+                  </a:r>
+                </a:p>
+              </p:txBody>
+            </p:sp>
+          </mc:Fallback>
+        </mc:AlternateContent>
+      </p:grpSp>
+      <p:grpSp>
+        <p:nvGrpSpPr>
+          <p:cNvPr id="29" name="Group 28">
+            <a:extLst>
+              <a:ext uri="{FF2B5EF4-FFF2-40B4-BE49-F238E27FC236}">
+                <a16:creationId xmlns:a16="http://schemas.microsoft.com/office/drawing/2014/main" id="{3FA0AA3C-7C05-1D4C-9846-CAE24ECE78CE}"/>
+              </a:ext>
+            </a:extLst>
+          </p:cNvPr>
+          <p:cNvGrpSpPr/>
+          <p:nvPr/>
+        </p:nvGrpSpPr>
+        <p:grpSpPr>
+          <a:xfrm>
+            <a:off x="4998584" y="1883228"/>
+            <a:ext cx="2264227" cy="435428"/>
+            <a:chOff x="4935991" y="4474029"/>
+            <a:chExt cx="2264227" cy="435428"/>
+          </a:xfrm>
+        </p:grpSpPr>
+        <p:sp>
+          <p:nvSpPr>
+            <p:cNvPr id="30" name="Rectangle 29">
+              <a:extLst>
+                <a:ext uri="{FF2B5EF4-FFF2-40B4-BE49-F238E27FC236}">
+                  <a16:creationId xmlns:a16="http://schemas.microsoft.com/office/drawing/2014/main" id="{A2513736-E4B7-6444-B814-32C0D08BB01F}"/>
+                </a:ext>
+              </a:extLst>
+            </p:cNvPr>
+            <p:cNvSpPr/>
+            <p:nvPr/>
+          </p:nvSpPr>
+          <p:spPr>
+            <a:xfrm>
+              <a:off x="4961165" y="4474029"/>
+              <a:ext cx="2213880" cy="435428"/>
+            </a:xfrm>
+            <a:prstGeom prst="rect">
+              <a:avLst/>
+            </a:prstGeom>
+            <a:solidFill>
+              <a:schemeClr val="accent4">
+                <a:lumMod val="40000"/>
+                <a:lumOff val="60000"/>
+              </a:schemeClr>
+            </a:solidFill>
+            <a:ln>
+              <a:noFill/>
+            </a:ln>
+          </p:spPr>
+          <p:style>
+            <a:lnRef idx="2">
+              <a:schemeClr val="accent1">
+                <a:shade val="50000"/>
+              </a:schemeClr>
+            </a:lnRef>
+            <a:fillRef idx="1">
+              <a:schemeClr val="accent1"/>
+            </a:fillRef>
+            <a:effectRef idx="0">
+              <a:schemeClr val="accent1"/>
+            </a:effectRef>
+            <a:fontRef idx="minor">
+              <a:schemeClr val="lt1"/>
+            </a:fontRef>
+          </p:style>
+          <p:txBody>
+            <a:bodyPr rtlCol="0" anchor="ctr"/>
+            <a:lstStyle/>
+            <a:p>
+              <a:pPr algn="ctr"/>
+              <a:endParaRPr lang="en-US"/>
+            </a:p>
+          </p:txBody>
+        </p:sp>
+        <mc:AlternateContent xmlns:mc="http://schemas.openxmlformats.org/markup-compatibility/2006" xmlns:a14="http://schemas.microsoft.com/office/drawing/2010/main">
+          <mc:Choice Requires="a14">
+            <p:sp>
+              <p:nvSpPr>
+                <p:cNvPr id="31" name="TextBox 30">
+                  <a:extLst>
+                    <a:ext uri="{FF2B5EF4-FFF2-40B4-BE49-F238E27FC236}">
+                      <a16:creationId xmlns:a16="http://schemas.microsoft.com/office/drawing/2014/main" id="{B244273F-BDF8-D14D-8CD5-214C6A58A368}"/>
+                    </a:ext>
+                  </a:extLst>
+                </p:cNvPr>
+                <p:cNvSpPr txBox="1"/>
+                <p:nvPr/>
+              </p:nvSpPr>
+              <p:spPr>
+                <a:xfrm>
+                  <a:off x="4935991" y="4490982"/>
+                  <a:ext cx="2264227" cy="400110"/>
+                </a:xfrm>
+                <a:prstGeom prst="rect">
+                  <a:avLst/>
+                </a:prstGeom>
+                <a:noFill/>
+              </p:spPr>
+              <p:txBody>
+                <a:bodyPr wrap="square" rtlCol="0">
+                  <a:spAutoFit/>
+                </a:bodyPr>
+                <a:lstStyle/>
+                <a:p>
+                  <a:pPr algn="ctr"/>
+                  <a14:m>
+                    <m:oMath xmlns:m="http://schemas.openxmlformats.org/officeDocument/2006/math">
+                      <m:r>
+                        <a:rPr lang="en-GB" sz="2000" b="0" i="1" smtClean="0">
+                          <a:latin typeface="Cambria Math" panose="02040503050406030204" pitchFamily="18" charset="0"/>
+                          <a:ea typeface="Source Sans Pro" panose="020F0502020204030204" pitchFamily="34" charset="0"/>
+                        </a:rPr>
+                        <m:t>𝑊</m:t>
+                      </m:r>
+                      <m:d>
+                        <m:dPr>
+                          <m:ctrlPr>
+                            <a:rPr lang="en-GB" sz="2000" b="0" i="1" smtClean="0">
+                              <a:latin typeface="Cambria Math" panose="02040503050406030204" pitchFamily="18" charset="0"/>
+                              <a:ea typeface="Source Sans Pro" panose="020F0502020204030204" pitchFamily="34" charset="0"/>
+                            </a:rPr>
+                          </m:ctrlPr>
+                        </m:dPr>
+                        <m:e>
+                          <m:r>
+                            <a:rPr lang="en-GB" sz="2000" b="0" i="1" smtClean="0">
+                              <a:latin typeface="Cambria Math" panose="02040503050406030204" pitchFamily="18" charset="0"/>
+                              <a:ea typeface="Cambria Math" panose="02040503050406030204" pitchFamily="18" charset="0"/>
+                            </a:rPr>
+                            <m:t>→ℓ</m:t>
+                          </m:r>
+                          <m:r>
+                            <a:rPr lang="en-GB" sz="2000" b="0" i="1" smtClean="0">
+                              <a:latin typeface="Cambria Math" panose="02040503050406030204" pitchFamily="18" charset="0"/>
+                              <a:ea typeface="Cambria Math" panose="02040503050406030204" pitchFamily="18" charset="0"/>
+                            </a:rPr>
+                            <m:t>𝜐</m:t>
+                          </m:r>
+                        </m:e>
+                      </m:d>
+                      <m:r>
+                        <a:rPr lang="en-GB" sz="2000" b="0" i="1" smtClean="0">
+                          <a:latin typeface="Cambria Math" panose="02040503050406030204" pitchFamily="18" charset="0"/>
+                          <a:ea typeface="Cambria Math" panose="02040503050406030204" pitchFamily="18" charset="0"/>
+                        </a:rPr>
+                        <m:t>/</m:t>
+                      </m:r>
+                      <m:r>
+                        <a:rPr lang="en-GB" sz="2000" b="0" i="1" smtClean="0">
+                          <a:latin typeface="Cambria Math" panose="02040503050406030204" pitchFamily="18" charset="0"/>
+                          <a:ea typeface="Cambria Math" panose="02040503050406030204" pitchFamily="18" charset="0"/>
+                        </a:rPr>
+                        <m:t>𝑡</m:t>
+                      </m:r>
+                      <m:acc>
+                        <m:accPr>
+                          <m:chr m:val="̅"/>
+                          <m:ctrlPr>
+                            <a:rPr lang="en-GB" sz="2000" b="0" i="1" smtClean="0">
+                              <a:latin typeface="Cambria Math" panose="02040503050406030204" pitchFamily="18" charset="0"/>
+                              <a:ea typeface="Cambria Math" panose="02040503050406030204" pitchFamily="18" charset="0"/>
+                            </a:rPr>
+                          </m:ctrlPr>
+                        </m:accPr>
+                        <m:e>
+                          <m:r>
+                            <a:rPr lang="en-GB" sz="2000" b="0" i="1" smtClean="0">
+                              <a:latin typeface="Cambria Math" panose="02040503050406030204" pitchFamily="18" charset="0"/>
+                              <a:ea typeface="Cambria Math" panose="02040503050406030204" pitchFamily="18" charset="0"/>
+                            </a:rPr>
+                            <m:t>𝑡</m:t>
+                          </m:r>
+                        </m:e>
+                      </m:acc>
+                      <m:r>
+                        <a:rPr lang="en-GB" sz="2000" b="0" i="1" smtClean="0">
+                          <a:latin typeface="Cambria Math" panose="02040503050406030204" pitchFamily="18" charset="0"/>
+                          <a:ea typeface="Cambria Math" panose="02040503050406030204" pitchFamily="18" charset="0"/>
+                        </a:rPr>
+                        <m:t>+</m:t>
+                      </m:r>
+                    </m:oMath>
+                  </a14:m>
+                  <a:r>
+                    <a:rPr lang="en-US" sz="2000" dirty="0">
+                      <a:latin typeface="Source Sans Pro" panose="020F0502020204030204" pitchFamily="34" charset="0"/>
+                      <a:ea typeface="Source Sans Pro" panose="020F0502020204030204" pitchFamily="34" charset="0"/>
+                    </a:rPr>
+                    <a:t> jets</a:t>
+                  </a:r>
+                </a:p>
+              </p:txBody>
+            </p:sp>
+          </mc:Choice>
+          <mc:Fallback xmlns="">
+            <p:sp>
+              <p:nvSpPr>
+                <p:cNvPr id="31" name="TextBox 30">
+                  <a:extLst>
+                    <a:ext uri="{FF2B5EF4-FFF2-40B4-BE49-F238E27FC236}">
+                      <a16:creationId xmlns:a16="http://schemas.microsoft.com/office/drawing/2014/main" id="{B244273F-BDF8-D14D-8CD5-214C6A58A368}"/>
+                    </a:ext>
+                  </a:extLst>
+                </p:cNvPr>
+                <p:cNvSpPr txBox="1">
+                  <a:spLocks noRot="1" noChangeAspect="1" noMove="1" noResize="1" noEditPoints="1" noAdjustHandles="1" noChangeArrowheads="1" noChangeShapeType="1" noTextEdit="1"/>
+                </p:cNvSpPr>
+                <p:nvPr/>
+              </p:nvSpPr>
+              <p:spPr>
+                <a:xfrm>
+                  <a:off x="4935991" y="4490982"/>
+                  <a:ext cx="2264227" cy="400110"/>
+                </a:xfrm>
+                <a:prstGeom prst="rect">
+                  <a:avLst/>
+                </a:prstGeom>
+                <a:blipFill>
+                  <a:blip r:embed="rId8"/>
+                  <a:stretch>
+                    <a:fillRect t="-9375" r="-1117" b="-25000"/>
+                  </a:stretch>
+                </a:blipFill>
+              </p:spPr>
+              <p:txBody>
+                <a:bodyPr/>
+                <a:lstStyle/>
+                <a:p>
+                  <a:r>
+                    <a:rPr lang="en-US">
+                      <a:noFill/>
+                    </a:rPr>
+                    <a:t> </a:t>
+                  </a:r>
+                </a:p>
+              </p:txBody>
+            </p:sp>
+          </mc:Fallback>
+        </mc:AlternateContent>
+      </p:grpSp>
+      <p:grpSp>
+        <p:nvGrpSpPr>
+          <p:cNvPr id="32" name="Group 31">
+            <a:extLst>
+              <a:ext uri="{FF2B5EF4-FFF2-40B4-BE49-F238E27FC236}">
+                <a16:creationId xmlns:a16="http://schemas.microsoft.com/office/drawing/2014/main" id="{9BBF9C4F-96AF-B443-892E-C1D7796A091E}"/>
+              </a:ext>
+            </a:extLst>
+          </p:cNvPr>
+          <p:cNvGrpSpPr/>
+          <p:nvPr/>
+        </p:nvGrpSpPr>
+        <p:grpSpPr>
+          <a:xfrm>
+            <a:off x="7701643" y="2895600"/>
+            <a:ext cx="1905000" cy="1066800"/>
+            <a:chOff x="3537858" y="979713"/>
+            <a:chExt cx="1905000" cy="1066800"/>
+          </a:xfrm>
+        </p:grpSpPr>
+        <p:sp>
+          <p:nvSpPr>
+            <p:cNvPr id="33" name="Oval 32">
+              <a:extLst>
+                <a:ext uri="{FF2B5EF4-FFF2-40B4-BE49-F238E27FC236}">
+                  <a16:creationId xmlns:a16="http://schemas.microsoft.com/office/drawing/2014/main" id="{16F48F13-BD5C-D74E-A31E-8D1E619C59CA}"/>
+                </a:ext>
+              </a:extLst>
+            </p:cNvPr>
+            <p:cNvSpPr/>
+            <p:nvPr/>
+          </p:nvSpPr>
+          <p:spPr>
+            <a:xfrm>
+              <a:off x="3537858" y="979713"/>
+              <a:ext cx="1905000" cy="1066800"/>
+            </a:xfrm>
+            <a:prstGeom prst="ellipse">
+              <a:avLst/>
+            </a:prstGeom>
+            <a:solidFill>
+              <a:schemeClr val="accent1">
+                <a:lumMod val="60000"/>
+                <a:lumOff val="40000"/>
+              </a:schemeClr>
+            </a:solidFill>
+            <a:ln w="19050">
+              <a:solidFill>
+                <a:schemeClr val="tx1"/>
+              </a:solidFill>
+            </a:ln>
+          </p:spPr>
+          <p:style>
+            <a:lnRef idx="2">
+              <a:schemeClr val="accent1">
+                <a:shade val="50000"/>
+              </a:schemeClr>
+            </a:lnRef>
+            <a:fillRef idx="1">
+              <a:schemeClr val="accent1"/>
+            </a:fillRef>
+            <a:effectRef idx="0">
+              <a:schemeClr val="accent1"/>
+            </a:effectRef>
+            <a:fontRef idx="minor">
+              <a:schemeClr val="lt1"/>
+            </a:fontRef>
+          </p:style>
+          <p:txBody>
+            <a:bodyPr rtlCol="0" anchor="ctr"/>
+            <a:lstStyle/>
+            <a:p>
+              <a:pPr algn="ctr"/>
+              <a:endParaRPr lang="en-US"/>
+            </a:p>
+          </p:txBody>
+        </p:sp>
+        <p:sp>
+          <p:nvSpPr>
+            <p:cNvPr id="34" name="TextBox 33">
+              <a:extLst>
+                <a:ext uri="{FF2B5EF4-FFF2-40B4-BE49-F238E27FC236}">
+                  <a16:creationId xmlns:a16="http://schemas.microsoft.com/office/drawing/2014/main" id="{3C04C8F9-E81F-9E4C-9D9C-9D7524641DDB}"/>
+                </a:ext>
+              </a:extLst>
+            </p:cNvPr>
+            <p:cNvSpPr txBox="1"/>
+            <p:nvPr/>
+          </p:nvSpPr>
+          <p:spPr>
+            <a:xfrm>
+              <a:off x="3837215" y="1159170"/>
+              <a:ext cx="1306285" cy="707886"/>
+            </a:xfrm>
+            <a:prstGeom prst="rect">
+              <a:avLst/>
+            </a:prstGeom>
+            <a:noFill/>
+          </p:spPr>
+          <p:txBody>
+            <a:bodyPr wrap="square" rtlCol="0">
+              <a:spAutoFit/>
+            </a:bodyPr>
+            <a:lstStyle/>
+            <a:p>
+              <a:pPr algn="ctr"/>
+              <a:r>
+                <a:rPr lang="en-US" sz="2000" dirty="0">
+                  <a:latin typeface="Source Sans Pro" panose="020F0502020204030204" pitchFamily="34" charset="0"/>
+                  <a:ea typeface="Source Sans Pro" panose="020F0502020204030204" pitchFamily="34" charset="0"/>
+                </a:rPr>
+                <a:t>Signal region</a:t>
+              </a:r>
+            </a:p>
+          </p:txBody>
+        </p:sp>
+      </p:grpSp>
+      <p:cxnSp>
+        <p:nvCxnSpPr>
+          <p:cNvPr id="36" name="Straight Arrow Connector 35">
+            <a:extLst>
+              <a:ext uri="{FF2B5EF4-FFF2-40B4-BE49-F238E27FC236}">
+                <a16:creationId xmlns:a16="http://schemas.microsoft.com/office/drawing/2014/main" id="{317D6CC5-AC06-5344-AED5-ADFFC95BCBB5}"/>
+              </a:ext>
+            </a:extLst>
+          </p:cNvPr>
+          <p:cNvCxnSpPr>
+            <a:cxnSpLocks/>
+            <a:stCxn id="15" idx="0"/>
+            <a:endCxn id="26" idx="2"/>
+          </p:cNvCxnSpPr>
+          <p:nvPr/>
+        </p:nvCxnSpPr>
+        <p:spPr>
+          <a:xfrm flipV="1">
+            <a:off x="3956958" y="4974772"/>
+            <a:ext cx="2139043" cy="693281"/>
+          </a:xfrm>
+          <a:prstGeom prst="straightConnector1">
+            <a:avLst/>
+          </a:prstGeom>
+          <a:ln w="9525">
+            <a:tailEnd type="triangle"/>
+          </a:ln>
+        </p:spPr>
+        <p:style>
+          <a:lnRef idx="1">
+            <a:schemeClr val="dk1"/>
+          </a:lnRef>
+          <a:fillRef idx="0">
+            <a:schemeClr val="dk1"/>
+          </a:fillRef>
+          <a:effectRef idx="0">
+            <a:schemeClr val="dk1"/>
+          </a:effectRef>
+          <a:fontRef idx="minor">
+            <a:schemeClr val="tx1"/>
+          </a:fontRef>
+        </p:style>
+      </p:cxnSp>
+      <p:cxnSp>
+        <p:nvCxnSpPr>
+          <p:cNvPr id="37" name="Straight Arrow Connector 36">
+            <a:extLst>
+              <a:ext uri="{FF2B5EF4-FFF2-40B4-BE49-F238E27FC236}">
+                <a16:creationId xmlns:a16="http://schemas.microsoft.com/office/drawing/2014/main" id="{0BEE8197-5761-D843-9CBE-E3ABD665232C}"/>
+              </a:ext>
+            </a:extLst>
+          </p:cNvPr>
+          <p:cNvCxnSpPr>
+            <a:cxnSpLocks/>
+            <a:stCxn id="21" idx="0"/>
+            <a:endCxn id="26" idx="2"/>
+          </p:cNvCxnSpPr>
+          <p:nvPr/>
+        </p:nvCxnSpPr>
+        <p:spPr>
+          <a:xfrm flipV="1">
+            <a:off x="6096000" y="4974772"/>
+            <a:ext cx="1" cy="693281"/>
+          </a:xfrm>
+          <a:prstGeom prst="straightConnector1">
+            <a:avLst/>
+          </a:prstGeom>
+          <a:ln w="9525">
+            <a:tailEnd type="triangle"/>
+          </a:ln>
+        </p:spPr>
+        <p:style>
+          <a:lnRef idx="1">
+            <a:schemeClr val="dk1"/>
+          </a:lnRef>
+          <a:fillRef idx="0">
+            <a:schemeClr val="dk1"/>
+          </a:fillRef>
+          <a:effectRef idx="0">
+            <a:schemeClr val="dk1"/>
+          </a:effectRef>
+          <a:fontRef idx="minor">
+            <a:schemeClr val="tx1"/>
+          </a:fontRef>
+        </p:style>
+      </p:cxnSp>
+      <p:cxnSp>
+        <p:nvCxnSpPr>
+          <p:cNvPr id="40" name="Straight Arrow Connector 39">
+            <a:extLst>
+              <a:ext uri="{FF2B5EF4-FFF2-40B4-BE49-F238E27FC236}">
+                <a16:creationId xmlns:a16="http://schemas.microsoft.com/office/drawing/2014/main" id="{E1DD62D9-AD37-1546-BC37-8EB9FA495903}"/>
+              </a:ext>
+            </a:extLst>
+          </p:cNvPr>
+          <p:cNvCxnSpPr>
+            <a:cxnSpLocks/>
+            <a:stCxn id="18" idx="0"/>
+            <a:endCxn id="26" idx="2"/>
+          </p:cNvCxnSpPr>
+          <p:nvPr/>
+        </p:nvCxnSpPr>
+        <p:spPr>
+          <a:xfrm flipH="1" flipV="1">
+            <a:off x="6096001" y="4974772"/>
+            <a:ext cx="2196192" cy="693281"/>
+          </a:xfrm>
+          <a:prstGeom prst="straightConnector1">
+            <a:avLst/>
+          </a:prstGeom>
+          <a:ln w="9525">
+            <a:tailEnd type="triangle"/>
+          </a:ln>
+        </p:spPr>
+        <p:style>
+          <a:lnRef idx="1">
+            <a:schemeClr val="dk1"/>
+          </a:lnRef>
+          <a:fillRef idx="0">
+            <a:schemeClr val="dk1"/>
+          </a:fillRef>
+          <a:effectRef idx="0">
+            <a:schemeClr val="dk1"/>
+          </a:effectRef>
+          <a:fontRef idx="minor">
+            <a:schemeClr val="tx1"/>
+          </a:fontRef>
+        </p:style>
+      </p:cxnSp>
+      <p:cxnSp>
+        <p:nvCxnSpPr>
+          <p:cNvPr id="47" name="Straight Arrow Connector 46">
+            <a:extLst>
+              <a:ext uri="{FF2B5EF4-FFF2-40B4-BE49-F238E27FC236}">
+                <a16:creationId xmlns:a16="http://schemas.microsoft.com/office/drawing/2014/main" id="{2A41827F-962B-D44F-9018-50E6C8B84F27}"/>
+              </a:ext>
+            </a:extLst>
+          </p:cNvPr>
+          <p:cNvCxnSpPr>
+            <a:cxnSpLocks/>
+            <a:stCxn id="8" idx="4"/>
+            <a:endCxn id="30" idx="0"/>
+          </p:cNvCxnSpPr>
+          <p:nvPr/>
+        </p:nvCxnSpPr>
+        <p:spPr>
+          <a:xfrm>
+            <a:off x="4490358" y="1189947"/>
+            <a:ext cx="1640340" cy="693281"/>
+          </a:xfrm>
+          <a:prstGeom prst="straightConnector1">
+            <a:avLst/>
+          </a:prstGeom>
+          <a:ln w="9525">
+            <a:tailEnd type="triangle"/>
+          </a:ln>
+        </p:spPr>
+        <p:style>
+          <a:lnRef idx="1">
+            <a:schemeClr val="dk1"/>
+          </a:lnRef>
+          <a:fillRef idx="0">
+            <a:schemeClr val="dk1"/>
+          </a:fillRef>
+          <a:effectRef idx="0">
+            <a:schemeClr val="dk1"/>
+          </a:effectRef>
+          <a:fontRef idx="minor">
+            <a:schemeClr val="tx1"/>
+          </a:fontRef>
+        </p:style>
+      </p:cxnSp>
+      <p:cxnSp>
+        <p:nvCxnSpPr>
+          <p:cNvPr id="50" name="Straight Arrow Connector 49">
+            <a:extLst>
+              <a:ext uri="{FF2B5EF4-FFF2-40B4-BE49-F238E27FC236}">
+                <a16:creationId xmlns:a16="http://schemas.microsoft.com/office/drawing/2014/main" id="{DE4AEC4B-E05F-6A4B-8950-F41DC011E5D4}"/>
+              </a:ext>
+            </a:extLst>
+          </p:cNvPr>
+          <p:cNvCxnSpPr>
+            <a:cxnSpLocks/>
+            <a:stCxn id="9" idx="4"/>
+            <a:endCxn id="30" idx="0"/>
+          </p:cNvCxnSpPr>
+          <p:nvPr/>
+        </p:nvCxnSpPr>
+        <p:spPr>
+          <a:xfrm flipH="1">
+            <a:off x="6130698" y="1189947"/>
+            <a:ext cx="1570945" cy="693281"/>
+          </a:xfrm>
+          <a:prstGeom prst="straightConnector1">
+            <a:avLst/>
+          </a:prstGeom>
+          <a:ln w="9525">
+            <a:tailEnd type="triangle"/>
+          </a:ln>
+        </p:spPr>
+        <p:style>
+          <a:lnRef idx="1">
+            <a:schemeClr val="dk1"/>
+          </a:lnRef>
+          <a:fillRef idx="0">
+            <a:schemeClr val="dk1"/>
+          </a:fillRef>
+          <a:effectRef idx="0">
+            <a:schemeClr val="dk1"/>
+          </a:effectRef>
+          <a:fontRef idx="minor">
+            <a:schemeClr val="tx1"/>
+          </a:fontRef>
+        </p:style>
+      </p:cxnSp>
+      <p:cxnSp>
+        <p:nvCxnSpPr>
+          <p:cNvPr id="53" name="Straight Arrow Connector 52">
+            <a:extLst>
+              <a:ext uri="{FF2B5EF4-FFF2-40B4-BE49-F238E27FC236}">
+                <a16:creationId xmlns:a16="http://schemas.microsoft.com/office/drawing/2014/main" id="{9A991D3B-C976-604B-9DCC-5776360F5B6E}"/>
+              </a:ext>
+            </a:extLst>
+          </p:cNvPr>
+          <p:cNvCxnSpPr>
+            <a:cxnSpLocks/>
+            <a:stCxn id="30" idx="2"/>
+            <a:endCxn id="33" idx="1"/>
+          </p:cNvCxnSpPr>
+          <p:nvPr/>
+        </p:nvCxnSpPr>
+        <p:spPr>
+          <a:xfrm>
+            <a:off x="6130698" y="2318656"/>
+            <a:ext cx="1849926" cy="733173"/>
+          </a:xfrm>
+          <a:prstGeom prst="straightConnector1">
+            <a:avLst/>
+          </a:prstGeom>
+          <a:ln w="9525">
+            <a:tailEnd type="triangle"/>
+          </a:ln>
+        </p:spPr>
+        <p:style>
+          <a:lnRef idx="1">
+            <a:schemeClr val="dk1"/>
+          </a:lnRef>
+          <a:fillRef idx="0">
+            <a:schemeClr val="dk1"/>
+          </a:fillRef>
+          <a:effectRef idx="0">
+            <a:schemeClr val="dk1"/>
+          </a:effectRef>
+          <a:fontRef idx="minor">
+            <a:schemeClr val="tx1"/>
+          </a:fontRef>
+        </p:style>
+      </p:cxnSp>
+      <p:cxnSp>
+        <p:nvCxnSpPr>
+          <p:cNvPr id="57" name="Straight Arrow Connector 56">
+            <a:extLst>
+              <a:ext uri="{FF2B5EF4-FFF2-40B4-BE49-F238E27FC236}">
+                <a16:creationId xmlns:a16="http://schemas.microsoft.com/office/drawing/2014/main" id="{EEE37495-514A-8845-8045-1CF0F74A2456}"/>
+              </a:ext>
+            </a:extLst>
+          </p:cNvPr>
+          <p:cNvCxnSpPr>
+            <a:cxnSpLocks/>
+            <a:stCxn id="27" idx="0"/>
+            <a:endCxn id="33" idx="3"/>
+          </p:cNvCxnSpPr>
+          <p:nvPr/>
+        </p:nvCxnSpPr>
+        <p:spPr>
+          <a:xfrm flipV="1">
+            <a:off x="6105526" y="3806171"/>
+            <a:ext cx="1875098" cy="733173"/>
+          </a:xfrm>
+          <a:prstGeom prst="straightConnector1">
+            <a:avLst/>
+          </a:prstGeom>
+          <a:ln w="9525">
+            <a:tailEnd type="triangle"/>
+          </a:ln>
+        </p:spPr>
+        <p:style>
+          <a:lnRef idx="1">
+            <a:schemeClr val="dk1"/>
+          </a:lnRef>
+          <a:fillRef idx="0">
+            <a:schemeClr val="dk1"/>
+          </a:fillRef>
+          <a:effectRef idx="0">
+            <a:schemeClr val="dk1"/>
+          </a:effectRef>
+          <a:fontRef idx="minor">
+            <a:schemeClr val="tx1"/>
+          </a:fontRef>
+        </p:style>
+      </p:cxnSp>
+      <p:cxnSp>
+        <p:nvCxnSpPr>
+          <p:cNvPr id="60" name="Straight Arrow Connector 59">
+            <a:extLst>
+              <a:ext uri="{FF2B5EF4-FFF2-40B4-BE49-F238E27FC236}">
+                <a16:creationId xmlns:a16="http://schemas.microsoft.com/office/drawing/2014/main" id="{699F0406-68D8-A54A-99BB-545EEA9CE46D}"/>
+              </a:ext>
+            </a:extLst>
+          </p:cNvPr>
+          <p:cNvCxnSpPr>
+            <a:cxnSpLocks/>
+            <a:stCxn id="30" idx="2"/>
+            <a:endCxn id="24" idx="7"/>
+          </p:cNvCxnSpPr>
+          <p:nvPr/>
+        </p:nvCxnSpPr>
+        <p:spPr>
+          <a:xfrm flipH="1">
+            <a:off x="4211377" y="2318656"/>
+            <a:ext cx="1919321" cy="733173"/>
+          </a:xfrm>
+          <a:prstGeom prst="straightConnector1">
+            <a:avLst/>
+          </a:prstGeom>
+          <a:ln w="9525">
+            <a:prstDash val="dash"/>
+            <a:tailEnd type="triangle"/>
+          </a:ln>
+        </p:spPr>
+        <p:style>
+          <a:lnRef idx="1">
+            <a:schemeClr val="dk1"/>
+          </a:lnRef>
+          <a:fillRef idx="0">
+            <a:schemeClr val="dk1"/>
+          </a:fillRef>
+          <a:effectRef idx="0">
+            <a:schemeClr val="dk1"/>
+          </a:effectRef>
+          <a:fontRef idx="minor">
+            <a:schemeClr val="tx1"/>
+          </a:fontRef>
+        </p:style>
+      </p:cxnSp>
+      <p:cxnSp>
+        <p:nvCxnSpPr>
+          <p:cNvPr id="63" name="Straight Arrow Connector 62">
+            <a:extLst>
+              <a:ext uri="{FF2B5EF4-FFF2-40B4-BE49-F238E27FC236}">
+                <a16:creationId xmlns:a16="http://schemas.microsoft.com/office/drawing/2014/main" id="{A939B323-4CB9-074A-89BE-0DBF9B952A77}"/>
+              </a:ext>
+            </a:extLst>
+          </p:cNvPr>
+          <p:cNvCxnSpPr>
+            <a:cxnSpLocks/>
+            <a:stCxn id="27" idx="0"/>
+            <a:endCxn id="24" idx="5"/>
+          </p:cNvCxnSpPr>
+          <p:nvPr/>
+        </p:nvCxnSpPr>
+        <p:spPr>
+          <a:xfrm flipH="1" flipV="1">
+            <a:off x="4211377" y="3806171"/>
+            <a:ext cx="1894149" cy="733173"/>
+          </a:xfrm>
+          <a:prstGeom prst="straightConnector1">
+            <a:avLst/>
+          </a:prstGeom>
+          <a:ln w="9525">
+            <a:prstDash val="dash"/>
+            <a:tailEnd type="triangle"/>
+          </a:ln>
+        </p:spPr>
+        <p:style>
+          <a:lnRef idx="1">
+            <a:schemeClr val="dk1"/>
+          </a:lnRef>
+          <a:fillRef idx="0">
+            <a:schemeClr val="dk1"/>
+          </a:fillRef>
+          <a:effectRef idx="0">
+            <a:schemeClr val="dk1"/>
+          </a:effectRef>
+          <a:fontRef idx="minor">
+            <a:schemeClr val="tx1"/>
+          </a:fontRef>
+        </p:style>
+      </p:cxnSp>
+      <p:cxnSp>
+        <p:nvCxnSpPr>
+          <p:cNvPr id="66" name="Straight Arrow Connector 65">
+            <a:extLst>
+              <a:ext uri="{FF2B5EF4-FFF2-40B4-BE49-F238E27FC236}">
+                <a16:creationId xmlns:a16="http://schemas.microsoft.com/office/drawing/2014/main" id="{7E4DE0F0-F2D7-D348-A16E-B597C1C0C26F}"/>
+              </a:ext>
+            </a:extLst>
+          </p:cNvPr>
+          <p:cNvCxnSpPr>
+            <a:cxnSpLocks/>
+            <a:stCxn id="24" idx="6"/>
+            <a:endCxn id="33" idx="2"/>
+          </p:cNvCxnSpPr>
+          <p:nvPr/>
+        </p:nvCxnSpPr>
+        <p:spPr>
+          <a:xfrm>
+            <a:off x="4490358" y="3429000"/>
+            <a:ext cx="3211285" cy="0"/>
+          </a:xfrm>
+          <a:prstGeom prst="straightConnector1">
+            <a:avLst/>
+          </a:prstGeom>
+          <a:ln w="9525">
+            <a:tailEnd type="triangle"/>
+          </a:ln>
+        </p:spPr>
+        <p:style>
+          <a:lnRef idx="1">
+            <a:schemeClr val="dk1"/>
+          </a:lnRef>
+          <a:fillRef idx="0">
+            <a:schemeClr val="dk1"/>
+          </a:fillRef>
+          <a:effectRef idx="0">
+            <a:schemeClr val="dk1"/>
+          </a:effectRef>
+          <a:fontRef idx="minor">
+            <a:schemeClr val="tx1"/>
+          </a:fontRef>
+        </p:style>
+      </p:cxnSp>
+      <p:sp>
+        <p:nvSpPr>
+          <p:cNvPr id="69" name="TextBox 68">
+            <a:extLst>
+              <a:ext uri="{FF2B5EF4-FFF2-40B4-BE49-F238E27FC236}">
+                <a16:creationId xmlns:a16="http://schemas.microsoft.com/office/drawing/2014/main" id="{1838777F-8B8C-9641-A67D-056F885785DC}"/>
+              </a:ext>
+            </a:extLst>
+          </p:cNvPr>
+          <p:cNvSpPr txBox="1"/>
+          <p:nvPr/>
+        </p:nvSpPr>
+        <p:spPr>
+          <a:xfrm rot="20370772">
+            <a:off x="4245716" y="2537873"/>
+            <a:ext cx="1066800" cy="307777"/>
+          </a:xfrm>
+          <a:prstGeom prst="rect">
+            <a:avLst/>
+          </a:prstGeom>
+          <a:noFill/>
+        </p:spPr>
+        <p:txBody>
+          <a:bodyPr wrap="square" rtlCol="0">
+            <a:spAutoFit/>
+          </a:bodyPr>
+          <a:lstStyle/>
+          <a:p>
+            <a:pPr algn="ctr"/>
+            <a:r>
+              <a:rPr lang="en-US" sz="1400" dirty="0">
+                <a:latin typeface="Source Sans Pro" panose="020F0502020204030204" pitchFamily="34" charset="0"/>
+                <a:ea typeface="Source Sans Pro" panose="020F0502020204030204" pitchFamily="34" charset="0"/>
+              </a:rPr>
+              <a:t>CR-only fit</a:t>
+            </a:r>
+          </a:p>
+        </p:txBody>
+      </p:sp>
+      <p:sp>
+        <p:nvSpPr>
+          <p:cNvPr id="70" name="TextBox 69">
+            <a:extLst>
+              <a:ext uri="{FF2B5EF4-FFF2-40B4-BE49-F238E27FC236}">
+                <a16:creationId xmlns:a16="http://schemas.microsoft.com/office/drawing/2014/main" id="{F636FA40-7C5A-3E43-BCCD-5CEE74D6F26A}"/>
+              </a:ext>
+            </a:extLst>
+          </p:cNvPr>
+          <p:cNvSpPr txBox="1"/>
+          <p:nvPr/>
+        </p:nvSpPr>
+        <p:spPr>
+          <a:xfrm rot="1267983">
+            <a:off x="4246232" y="4026649"/>
+            <a:ext cx="1066800" cy="307777"/>
+          </a:xfrm>
+          <a:prstGeom prst="rect">
+            <a:avLst/>
+          </a:prstGeom>
+          <a:noFill/>
+        </p:spPr>
+        <p:txBody>
+          <a:bodyPr wrap="square" rtlCol="0">
+            <a:spAutoFit/>
+          </a:bodyPr>
+          <a:lstStyle/>
+          <a:p>
+            <a:pPr algn="ctr"/>
+            <a:r>
+              <a:rPr lang="en-US" sz="1400" dirty="0">
+                <a:latin typeface="Source Sans Pro" panose="020F0502020204030204" pitchFamily="34" charset="0"/>
+                <a:ea typeface="Source Sans Pro" panose="020F0502020204030204" pitchFamily="34" charset="0"/>
+              </a:rPr>
+              <a:t>CR-only fit</a:t>
+            </a:r>
+          </a:p>
+        </p:txBody>
+      </p:sp>
+    </p:spTree>
+    <p:extLst>
+      <p:ext uri="{BB962C8B-B14F-4D97-AF65-F5344CB8AC3E}">
+        <p14:creationId xmlns:p14="http://schemas.microsoft.com/office/powerpoint/2010/main" val="2562965745"/>
+      </p:ext>
+    </p:extLst>
+  </p:cSld>
+  <p:clrMapOvr>
+    <a:masterClrMapping/>
+  </p:clrMapOvr>
+</p:sld>
+</file>
+
+<file path=ppt/slides/slide2.xml><?xml version="1.0" encoding="utf-8"?>
+<p:sld xmlns:a="http://schemas.openxmlformats.org/drawingml/2006/main" xmlns:r="http://schemas.openxmlformats.org/officeDocument/2006/relationships" xmlns:p="http://schemas.openxmlformats.org/presentationml/2006/main">
+  <p:cSld>
+    <p:spTree>
+      <p:nvGrpSpPr>
+        <p:cNvPr id="1" name=""/>
+        <p:cNvGrpSpPr/>
+        <p:nvPr/>
+      </p:nvGrpSpPr>
+      <p:grpSpPr>
+        <a:xfrm>
+          <a:off x="0" y="0"/>
+          <a:ext cx="0" cy="0"/>
+          <a:chOff x="0" y="0"/>
+          <a:chExt cx="0" cy="0"/>
+        </a:xfrm>
+      </p:grpSpPr>
+      <p:grpSp>
+        <p:nvGrpSpPr>
+          <p:cNvPr id="12" name="Group 11">
+            <a:extLst>
+              <a:ext uri="{FF2B5EF4-FFF2-40B4-BE49-F238E27FC236}">
+                <a16:creationId xmlns:a16="http://schemas.microsoft.com/office/drawing/2014/main" id="{0DBFC14C-51D1-E54F-BA4B-19BBB6190712}"/>
+              </a:ext>
+            </a:extLst>
+          </p:cNvPr>
+          <p:cNvGrpSpPr/>
+          <p:nvPr/>
+        </p:nvGrpSpPr>
+        <p:grpSpPr>
+          <a:xfrm>
+            <a:off x="3537858" y="123147"/>
+            <a:ext cx="1905000" cy="1066800"/>
+            <a:chOff x="3537858" y="979713"/>
+            <a:chExt cx="1905000" cy="1066800"/>
+          </a:xfrm>
+        </p:grpSpPr>
+        <p:sp>
+          <p:nvSpPr>
+            <p:cNvPr id="8" name="Oval 7">
+              <a:extLst>
+                <a:ext uri="{FF2B5EF4-FFF2-40B4-BE49-F238E27FC236}">
+                  <a16:creationId xmlns:a16="http://schemas.microsoft.com/office/drawing/2014/main" id="{D96265D2-C650-A64B-9DAC-40E0AD732850}"/>
+                </a:ext>
+              </a:extLst>
+            </p:cNvPr>
+            <p:cNvSpPr/>
+            <p:nvPr/>
+          </p:nvSpPr>
+          <p:spPr>
+            <a:xfrm>
+              <a:off x="3537858" y="979713"/>
+              <a:ext cx="1905000" cy="1066800"/>
+            </a:xfrm>
+            <a:prstGeom prst="ellipse">
+              <a:avLst/>
+            </a:prstGeom>
+            <a:solidFill>
+              <a:schemeClr val="accent4">
+                <a:lumMod val="60000"/>
+                <a:lumOff val="40000"/>
+              </a:schemeClr>
+            </a:solidFill>
+            <a:ln>
+              <a:noFill/>
+            </a:ln>
+          </p:spPr>
+          <p:style>
+            <a:lnRef idx="2">
+              <a:schemeClr val="accent1">
+                <a:shade val="50000"/>
+              </a:schemeClr>
+            </a:lnRef>
+            <a:fillRef idx="1">
+              <a:schemeClr val="accent1"/>
+            </a:fillRef>
+            <a:effectRef idx="0">
+              <a:schemeClr val="accent1"/>
+            </a:effectRef>
+            <a:fontRef idx="minor">
+              <a:schemeClr val="lt1"/>
+            </a:fontRef>
+          </p:style>
+          <p:txBody>
+            <a:bodyPr rtlCol="0" anchor="ctr"/>
+            <a:lstStyle/>
+            <a:p>
+              <a:pPr algn="ctr"/>
+              <a:endParaRPr lang="en-US" dirty="0"/>
+            </a:p>
+          </p:txBody>
+        </p:sp>
         <mc:AlternateContent xmlns:mc="http://schemas.openxmlformats.org/markup-compatibility/2006">
           <mc:Choice xmlns:a14="http://schemas.microsoft.com/office/drawing/2010/main" Requires="a14">
             <p:sp>
@@ -3503,7 +5640,7 @@
                 <a:blipFill>
                   <a:blip r:embed="rId2"/>
                   <a:stretch>
-                    <a:fillRect t="-3509" r="-7143" b="-14035"/>
+                    <a:fillRect t="-5263" r="-8235" b="-14035"/>
                   </a:stretch>
                 </a:blipFill>
               </p:spPr>
@@ -3687,7 +5824,7 @@
                 <a:blipFill>
                   <a:blip r:embed="rId3"/>
                   <a:stretch>
-                    <a:fillRect t="-3509" r="-1064" b="-14035"/>
+                    <a:fillRect t="-5263" r="-2151" b="-14035"/>
                   </a:stretch>
                 </a:blipFill>
                 <a:ln>
@@ -3871,7 +6008,7 @@
                 <a:blipFill>
                   <a:blip r:embed="rId4"/>
                   <a:stretch>
-                    <a:fillRect t="-3509" r="-5102" b="-12281"/>
+                    <a:fillRect t="-3509" r="-6186" b="-14035"/>
                   </a:stretch>
                 </a:blipFill>
               </p:spPr>
@@ -4052,7 +6189,7 @@
                 <a:blipFill>
                   <a:blip r:embed="rId5"/>
                   <a:stretch>
-                    <a:fillRect t="-3509" r="-7447" b="-12281"/>
+                    <a:fillRect t="-3509" r="-7447" b="-14035"/>
                   </a:stretch>
                 </a:blipFill>
               </p:spPr>
@@ -4233,7 +6370,7 @@
                 <a:blipFill>
                   <a:blip r:embed="rId6"/>
                   <a:stretch>
-                    <a:fillRect t="-3509" b="-12281"/>
+                    <a:fillRect t="-3509" r="-1042" b="-14035"/>
                   </a:stretch>
                 </a:blipFill>
               </p:spPr>
@@ -4555,7 +6692,7 @@
                 <a:blipFill>
                   <a:blip r:embed="rId7"/>
                   <a:stretch>
-                    <a:fillRect t="-6061" r="-2098" b="-24242"/>
+                    <a:fillRect t="-9375" r="-2797" b="-28125"/>
                   </a:stretch>
                 </a:blipFill>
               </p:spPr>
@@ -4796,7 +6933,7 @@
                 <a:blipFill>
                   <a:blip r:embed="rId8"/>
                   <a:stretch>
-                    <a:fillRect t="-9375" r="-1117" b="-25000"/>
+                    <a:fillRect t="-9375" r="-1676" b="-28125"/>
                   </a:stretch>
                 </a:blipFill>
               </p:spPr>
@@ -5334,14 +7471,14 @@
           <p:cNvCxnSpPr>
             <a:cxnSpLocks/>
             <a:stCxn id="24" idx="6"/>
-            <a:endCxn id="33" idx="2"/>
+            <a:endCxn id="43" idx="1"/>
           </p:cNvCxnSpPr>
           <p:nvPr/>
         </p:nvCxnSpPr>
         <p:spPr>
-          <a:xfrm>
-            <a:off x="4490358" y="3429000"/>
-            <a:ext cx="3211285" cy="0"/>
+          <a:xfrm flipV="1">
+            <a:off x="4490358" y="3426920"/>
+            <a:ext cx="817443" cy="2080"/>
           </a:xfrm>
           <a:prstGeom prst="straightConnector1">
             <a:avLst/>
@@ -5443,10 +7580,158 @@
           </a:p>
         </p:txBody>
       </p:sp>
+      <p:sp>
+        <p:nvSpPr>
+          <p:cNvPr id="2" name="Rectangle 1">
+            <a:extLst>
+              <a:ext uri="{FF2B5EF4-FFF2-40B4-BE49-F238E27FC236}">
+                <a16:creationId xmlns:a16="http://schemas.microsoft.com/office/drawing/2014/main" id="{4E43801F-7F74-424A-A778-7A312B3890FA}"/>
+              </a:ext>
+            </a:extLst>
+          </p:cNvPr>
+          <p:cNvSpPr/>
+          <p:nvPr/>
+        </p:nvSpPr>
+        <p:spPr>
+          <a:xfrm>
+            <a:off x="5307801" y="3208224"/>
+            <a:ext cx="1576398" cy="435428"/>
+          </a:xfrm>
+          <a:prstGeom prst="rect">
+            <a:avLst/>
+          </a:prstGeom>
+          <a:solidFill>
+            <a:schemeClr val="accent6">
+              <a:lumMod val="40000"/>
+              <a:lumOff val="60000"/>
+            </a:schemeClr>
+          </a:solidFill>
+          <a:ln>
+            <a:noFill/>
+          </a:ln>
+        </p:spPr>
+        <p:style>
+          <a:lnRef idx="2">
+            <a:schemeClr val="accent1">
+              <a:shade val="50000"/>
+            </a:schemeClr>
+          </a:lnRef>
+          <a:fillRef idx="1">
+            <a:schemeClr val="accent1"/>
+          </a:fillRef>
+          <a:effectRef idx="0">
+            <a:schemeClr val="accent1"/>
+          </a:effectRef>
+          <a:fontRef idx="minor">
+            <a:schemeClr val="lt1"/>
+          </a:fontRef>
+        </p:style>
+        <p:txBody>
+          <a:bodyPr rtlCol="0" anchor="ctr"/>
+          <a:lstStyle/>
+          <a:p>
+            <a:pPr algn="ctr"/>
+            <a:endParaRPr lang="en-US"/>
+          </a:p>
+        </p:txBody>
+      </p:sp>
+      <p:sp>
+        <p:nvSpPr>
+          <p:cNvPr id="43" name="TextBox 42">
+            <a:extLst>
+              <a:ext uri="{FF2B5EF4-FFF2-40B4-BE49-F238E27FC236}">
+                <a16:creationId xmlns:a16="http://schemas.microsoft.com/office/drawing/2014/main" id="{F656A2F0-24DC-A040-8231-9616D202E9E5}"/>
+              </a:ext>
+            </a:extLst>
+          </p:cNvPr>
+          <p:cNvSpPr txBox="1"/>
+          <p:nvPr/>
+        </p:nvSpPr>
+        <p:spPr>
+          <a:xfrm>
+            <a:off x="5307801" y="3226865"/>
+            <a:ext cx="1576398" cy="400110"/>
+          </a:xfrm>
+          <a:prstGeom prst="rect">
+            <a:avLst/>
+          </a:prstGeom>
+          <a:noFill/>
+        </p:spPr>
+        <p:txBody>
+          <a:bodyPr wrap="square" rtlCol="0">
+            <a:spAutoFit/>
+          </a:bodyPr>
+          <a:lstStyle/>
+          <a:p>
+            <a:pPr algn="ctr"/>
+            <a:r>
+              <a:rPr lang="en-US" sz="2000" dirty="0">
+                <a:latin typeface="Source Sans Pro" panose="020F0502020204030204" pitchFamily="34" charset="0"/>
+                <a:ea typeface="Source Sans Pro" panose="020F0502020204030204" pitchFamily="34" charset="0"/>
+              </a:rPr>
+              <a:t>QCD </a:t>
+            </a:r>
+            <a:r>
+              <a:rPr lang="en-US" sz="2000" dirty="0" err="1">
+                <a:latin typeface="Source Sans Pro" panose="020F0502020204030204" pitchFamily="34" charset="0"/>
+                <a:ea typeface="Source Sans Pro" panose="020F0502020204030204" pitchFamily="34" charset="0"/>
+              </a:rPr>
+              <a:t>multijet</a:t>
+            </a:r>
+            <a:endParaRPr lang="en-US" sz="2000" dirty="0">
+              <a:latin typeface="Source Sans Pro" panose="020F0502020204030204" pitchFamily="34" charset="0"/>
+              <a:ea typeface="Source Sans Pro" panose="020F0502020204030204" pitchFamily="34" charset="0"/>
+            </a:endParaRPr>
+          </a:p>
+        </p:txBody>
+      </p:sp>
+      <p:cxnSp>
+        <p:nvCxnSpPr>
+          <p:cNvPr id="45" name="Straight Arrow Connector 44">
+            <a:extLst>
+              <a:ext uri="{FF2B5EF4-FFF2-40B4-BE49-F238E27FC236}">
+                <a16:creationId xmlns:a16="http://schemas.microsoft.com/office/drawing/2014/main" id="{809E31EE-B668-554D-8BE7-53F0FF3E5F09}"/>
+              </a:ext>
+            </a:extLst>
+          </p:cNvPr>
+          <p:cNvCxnSpPr>
+            <a:cxnSpLocks/>
+            <a:stCxn id="43" idx="3"/>
+            <a:endCxn id="33" idx="2"/>
+          </p:cNvCxnSpPr>
+          <p:nvPr/>
+        </p:nvCxnSpPr>
+        <p:spPr>
+          <a:xfrm>
+            <a:off x="6884199" y="3426920"/>
+            <a:ext cx="817444" cy="2080"/>
+          </a:xfrm>
+          <a:prstGeom prst="straightConnector1">
+            <a:avLst/>
+          </a:prstGeom>
+          <a:ln w="9525">
+            <a:tailEnd type="triangle"/>
+          </a:ln>
+        </p:spPr>
+        <p:style>
+          <a:lnRef idx="1">
+            <a:schemeClr val="dk1"/>
+          </a:lnRef>
+          <a:fillRef idx="0">
+            <a:schemeClr val="dk1"/>
+          </a:fillRef>
+          <a:effectRef idx="0">
+            <a:schemeClr val="dk1"/>
+          </a:effectRef>
+          <a:fontRef idx="minor">
+            <a:schemeClr val="tx1"/>
+          </a:fontRef>
+        </p:style>
+      </p:cxnSp>
     </p:spTree>
     <p:extLst>
       <p:ext uri="{BB962C8B-B14F-4D97-AF65-F5344CB8AC3E}">
-        <p14:creationId xmlns:p14="http://schemas.microsoft.com/office/powerpoint/2010/main" val="2562965745"/>
+        <p14:creationId xmlns:p14="http://schemas.microsoft.com/office/powerpoint/2010/main" val="2846555955"/>
       </p:ext>
     </p:extLst>
   </p:cSld>

</xml_diff>

<commit_message>
Replacing the 'W->lnu/tt' with 'lost lepton' for single lepton prediction
</commit_message>
<xml_diff>
--- a/chapters/higgstoinv/figures/fit_overview.pptx
+++ b/chapters/higgstoinv/figures/fit_overview.pptx
@@ -262,7 +262,7 @@
           <a:p>
             <a:fld id="{4E9B3BD9-5FA9-634B-B9CC-896E9BF9BE03}" type="datetimeFigureOut">
               <a:rPr lang="en-US" smtClean="0"/>
-              <a:t>11/23/20</a:t>
+              <a:t>2/10/21</a:t>
             </a:fld>
             <a:endParaRPr lang="en-US"/>
           </a:p>
@@ -462,7 +462,7 @@
           <a:p>
             <a:fld id="{4E9B3BD9-5FA9-634B-B9CC-896E9BF9BE03}" type="datetimeFigureOut">
               <a:rPr lang="en-US" smtClean="0"/>
-              <a:t>11/23/20</a:t>
+              <a:t>2/10/21</a:t>
             </a:fld>
             <a:endParaRPr lang="en-US"/>
           </a:p>
@@ -672,7 +672,7 @@
           <a:p>
             <a:fld id="{4E9B3BD9-5FA9-634B-B9CC-896E9BF9BE03}" type="datetimeFigureOut">
               <a:rPr lang="en-US" smtClean="0"/>
-              <a:t>11/23/20</a:t>
+              <a:t>2/10/21</a:t>
             </a:fld>
             <a:endParaRPr lang="en-US"/>
           </a:p>
@@ -872,7 +872,7 @@
           <a:p>
             <a:fld id="{4E9B3BD9-5FA9-634B-B9CC-896E9BF9BE03}" type="datetimeFigureOut">
               <a:rPr lang="en-US" smtClean="0"/>
-              <a:t>11/23/20</a:t>
+              <a:t>2/10/21</a:t>
             </a:fld>
             <a:endParaRPr lang="en-US"/>
           </a:p>
@@ -1148,7 +1148,7 @@
           <a:p>
             <a:fld id="{4E9B3BD9-5FA9-634B-B9CC-896E9BF9BE03}" type="datetimeFigureOut">
               <a:rPr lang="en-US" smtClean="0"/>
-              <a:t>11/23/20</a:t>
+              <a:t>2/10/21</a:t>
             </a:fld>
             <a:endParaRPr lang="en-US"/>
           </a:p>
@@ -1416,7 +1416,7 @@
           <a:p>
             <a:fld id="{4E9B3BD9-5FA9-634B-B9CC-896E9BF9BE03}" type="datetimeFigureOut">
               <a:rPr lang="en-US" smtClean="0"/>
-              <a:t>11/23/20</a:t>
+              <a:t>2/10/21</a:t>
             </a:fld>
             <a:endParaRPr lang="en-US"/>
           </a:p>
@@ -1831,7 +1831,7 @@
           <a:p>
             <a:fld id="{4E9B3BD9-5FA9-634B-B9CC-896E9BF9BE03}" type="datetimeFigureOut">
               <a:rPr lang="en-US" smtClean="0"/>
-              <a:t>11/23/20</a:t>
+              <a:t>2/10/21</a:t>
             </a:fld>
             <a:endParaRPr lang="en-US"/>
           </a:p>
@@ -1973,7 +1973,7 @@
           <a:p>
             <a:fld id="{4E9B3BD9-5FA9-634B-B9CC-896E9BF9BE03}" type="datetimeFigureOut">
               <a:rPr lang="en-US" smtClean="0"/>
-              <a:t>11/23/20</a:t>
+              <a:t>2/10/21</a:t>
             </a:fld>
             <a:endParaRPr lang="en-US"/>
           </a:p>
@@ -2086,7 +2086,7 @@
           <a:p>
             <a:fld id="{4E9B3BD9-5FA9-634B-B9CC-896E9BF9BE03}" type="datetimeFigureOut">
               <a:rPr lang="en-US" smtClean="0"/>
-              <a:t>11/23/20</a:t>
+              <a:t>2/10/21</a:t>
             </a:fld>
             <a:endParaRPr lang="en-US"/>
           </a:p>
@@ -2399,7 +2399,7 @@
           <a:p>
             <a:fld id="{4E9B3BD9-5FA9-634B-B9CC-896E9BF9BE03}" type="datetimeFigureOut">
               <a:rPr lang="en-US" smtClean="0"/>
-              <a:t>11/23/20</a:t>
+              <a:t>2/10/21</a:t>
             </a:fld>
             <a:endParaRPr lang="en-US"/>
           </a:p>
@@ -2688,7 +2688,7 @@
           <a:p>
             <a:fld id="{4E9B3BD9-5FA9-634B-B9CC-896E9BF9BE03}" type="datetimeFigureOut">
               <a:rPr lang="en-US" smtClean="0"/>
-              <a:t>11/23/20</a:t>
+              <a:t>2/10/21</a:t>
             </a:fld>
             <a:endParaRPr lang="en-US"/>
           </a:p>
@@ -2931,7 +2931,7 @@
           <a:p>
             <a:fld id="{4E9B3BD9-5FA9-634B-B9CC-896E9BF9BE03}" type="datetimeFigureOut">
               <a:rPr lang="en-US" smtClean="0"/>
-              <a:t>11/23/20</a:t>
+              <a:t>2/10/21</a:t>
             </a:fld>
             <a:endParaRPr lang="en-US"/>
           </a:p>
@@ -4656,8 +4656,8 @@
             </a:p>
           </p:txBody>
         </p:sp>
-        <mc:AlternateContent xmlns:mc="http://schemas.openxmlformats.org/markup-compatibility/2006" xmlns:a14="http://schemas.microsoft.com/office/drawing/2010/main">
-          <mc:Choice Requires="a14">
+        <mc:AlternateContent xmlns:mc="http://schemas.openxmlformats.org/markup-compatibility/2006">
+          <mc:Choice xmlns:a14="http://schemas.microsoft.com/office/drawing/2010/main" Requires="a14">
             <p:sp>
               <p:nvSpPr>
                 <p:cNvPr id="31" name="TextBox 30">
@@ -4687,77 +4687,17 @@
                 <a:lstStyle/>
                 <a:p>
                   <a:pPr algn="ctr"/>
+                  <a:r>
+                    <a:rPr lang="en-US" sz="2000" dirty="0">
+                      <a:latin typeface="Source Sans Pro" panose="020F0502020204030204" pitchFamily="34" charset="0"/>
+                      <a:ea typeface="Source Sans Pro" panose="020F0502020204030204" pitchFamily="34" charset="0"/>
+                    </a:rPr>
+                    <a:t>Lost lepton </a:t>
+                  </a:r>
                   <a14:m>
                     <m:oMath xmlns:m="http://schemas.openxmlformats.org/officeDocument/2006/math">
                       <m:r>
-                        <a:rPr lang="en-GB" sz="2000" b="0" i="1" smtClean="0">
-                          <a:latin typeface="Cambria Math" panose="02040503050406030204" pitchFamily="18" charset="0"/>
-                          <a:ea typeface="Source Sans Pro" panose="020F0502020204030204" pitchFamily="34" charset="0"/>
-                        </a:rPr>
-                        <m:t>𝑊</m:t>
-                      </m:r>
-                      <m:d>
-                        <m:dPr>
-                          <m:ctrlPr>
-                            <a:rPr lang="en-GB" sz="2000" b="0" i="1" smtClean="0">
-                              <a:latin typeface="Cambria Math" panose="02040503050406030204" pitchFamily="18" charset="0"/>
-                              <a:ea typeface="Source Sans Pro" panose="020F0502020204030204" pitchFamily="34" charset="0"/>
-                            </a:rPr>
-                          </m:ctrlPr>
-                        </m:dPr>
-                        <m:e>
-                          <m:r>
-                            <a:rPr lang="en-GB" sz="2000" b="0" i="1" smtClean="0">
-                              <a:latin typeface="Cambria Math" panose="02040503050406030204" pitchFamily="18" charset="0"/>
-                              <a:ea typeface="Cambria Math" panose="02040503050406030204" pitchFamily="18" charset="0"/>
-                            </a:rPr>
-                            <m:t>→ℓ</m:t>
-                          </m:r>
-                          <m:r>
-                            <a:rPr lang="en-GB" sz="2000" b="0" i="1" smtClean="0">
-                              <a:latin typeface="Cambria Math" panose="02040503050406030204" pitchFamily="18" charset="0"/>
-                              <a:ea typeface="Cambria Math" panose="02040503050406030204" pitchFamily="18" charset="0"/>
-                            </a:rPr>
-                            <m:t>𝜐</m:t>
-                          </m:r>
-                        </m:e>
-                      </m:d>
-                      <m:r>
-                        <a:rPr lang="en-GB" sz="2000" b="0" i="1" smtClean="0">
-                          <a:latin typeface="Cambria Math" panose="02040503050406030204" pitchFamily="18" charset="0"/>
-                          <a:ea typeface="Cambria Math" panose="02040503050406030204" pitchFamily="18" charset="0"/>
-                        </a:rPr>
-                        <m:t>/</m:t>
-                      </m:r>
-                      <m:r>
-                        <a:rPr lang="en-GB" sz="2000" b="0" i="1" smtClean="0">
-                          <a:latin typeface="Cambria Math" panose="02040503050406030204" pitchFamily="18" charset="0"/>
-                          <a:ea typeface="Cambria Math" panose="02040503050406030204" pitchFamily="18" charset="0"/>
-                        </a:rPr>
-                        <m:t>𝑡</m:t>
-                      </m:r>
-                      <m:acc>
-                        <m:accPr>
-                          <m:chr m:val="̅"/>
-                          <m:ctrlPr>
-                            <a:rPr lang="en-GB" sz="2000" b="0" i="1" smtClean="0">
-                              <a:latin typeface="Cambria Math" panose="02040503050406030204" pitchFamily="18" charset="0"/>
-                              <a:ea typeface="Cambria Math" panose="02040503050406030204" pitchFamily="18" charset="0"/>
-                            </a:rPr>
-                          </m:ctrlPr>
-                        </m:accPr>
-                        <m:e>
-                          <m:r>
-                            <a:rPr lang="en-GB" sz="2000" b="0" i="1" smtClean="0">
-                              <a:latin typeface="Cambria Math" panose="02040503050406030204" pitchFamily="18" charset="0"/>
-                              <a:ea typeface="Cambria Math" panose="02040503050406030204" pitchFamily="18" charset="0"/>
-                            </a:rPr>
-                            <m:t>𝑡</m:t>
-                          </m:r>
-                        </m:e>
-                      </m:acc>
-                      <m:r>
-                        <a:rPr lang="en-GB" sz="2000" b="0" i="1" smtClean="0">
+                        <a:rPr lang="en-GB" sz="2000" i="1">
                           <a:latin typeface="Cambria Math" panose="02040503050406030204" pitchFamily="18" charset="0"/>
                           <a:ea typeface="Cambria Math" panose="02040503050406030204" pitchFamily="18" charset="0"/>
                         </a:rPr>
@@ -4776,7 +4716,7 @@
               </p:txBody>
             </p:sp>
           </mc:Choice>
-          <mc:Fallback xmlns="">
+          <mc:Fallback>
             <p:sp>
               <p:nvSpPr>
                 <p:cNvPr id="31" name="TextBox 30">
@@ -4802,7 +4742,7 @@
                 <a:blipFill>
                   <a:blip r:embed="rId8"/>
                   <a:stretch>
-                    <a:fillRect t="-9375" r="-1117" b="-25000"/>
+                    <a:fillRect t="-9375" b="-28125"/>
                   </a:stretch>
                 </a:blipFill>
               </p:spPr>
@@ -5554,8 +5494,8 @@
             </a:p>
           </p:txBody>
         </p:sp>
-        <mc:AlternateContent xmlns:mc="http://schemas.openxmlformats.org/markup-compatibility/2006">
-          <mc:Choice xmlns:a14="http://schemas.microsoft.com/office/drawing/2010/main" Requires="a14">
+        <mc:AlternateContent xmlns:mc="http://schemas.openxmlformats.org/markup-compatibility/2006" xmlns:a14="http://schemas.microsoft.com/office/drawing/2010/main">
+          <mc:Choice Requires="a14">
             <p:sp>
               <p:nvSpPr>
                 <p:cNvPr id="10" name="TextBox 9">
@@ -5614,7 +5554,7 @@
               </p:txBody>
             </p:sp>
           </mc:Choice>
-          <mc:Fallback>
+          <mc:Fallback xmlns="">
             <p:sp>
               <p:nvSpPr>
                 <p:cNvPr id="10" name="TextBox 9">
@@ -5735,8 +5675,8 @@
             </a:p>
           </p:txBody>
         </p:sp>
-        <mc:AlternateContent xmlns:mc="http://schemas.openxmlformats.org/markup-compatibility/2006">
-          <mc:Choice xmlns:a14="http://schemas.microsoft.com/office/drawing/2010/main" Requires="a14">
+        <mc:AlternateContent xmlns:mc="http://schemas.openxmlformats.org/markup-compatibility/2006" xmlns:a14="http://schemas.microsoft.com/office/drawing/2010/main">
+          <mc:Choice Requires="a14">
             <p:sp>
               <p:nvSpPr>
                 <p:cNvPr id="11" name="TextBox 10">
@@ -5798,7 +5738,7 @@
               </p:txBody>
             </p:sp>
           </mc:Choice>
-          <mc:Fallback>
+          <mc:Fallback xmlns="">
             <p:sp>
               <p:nvSpPr>
                 <p:cNvPr id="11" name="TextBox 10">
@@ -5922,8 +5862,8 @@
             </a:p>
           </p:txBody>
         </p:sp>
-        <mc:AlternateContent xmlns:mc="http://schemas.openxmlformats.org/markup-compatibility/2006">
-          <mc:Choice xmlns:a14="http://schemas.microsoft.com/office/drawing/2010/main" Requires="a14">
+        <mc:AlternateContent xmlns:mc="http://schemas.openxmlformats.org/markup-compatibility/2006" xmlns:a14="http://schemas.microsoft.com/office/drawing/2010/main">
+          <mc:Choice Requires="a14">
             <p:sp>
               <p:nvSpPr>
                 <p:cNvPr id="16" name="TextBox 15">
@@ -5982,7 +5922,7 @@
               </p:txBody>
             </p:sp>
           </mc:Choice>
-          <mc:Fallback>
+          <mc:Fallback xmlns="">
             <p:sp>
               <p:nvSpPr>
                 <p:cNvPr id="16" name="TextBox 15">
@@ -6103,8 +6043,8 @@
             </a:p>
           </p:txBody>
         </p:sp>
-        <mc:AlternateContent xmlns:mc="http://schemas.openxmlformats.org/markup-compatibility/2006">
-          <mc:Choice xmlns:a14="http://schemas.microsoft.com/office/drawing/2010/main" Requires="a14">
+        <mc:AlternateContent xmlns:mc="http://schemas.openxmlformats.org/markup-compatibility/2006" xmlns:a14="http://schemas.microsoft.com/office/drawing/2010/main">
+          <mc:Choice Requires="a14">
             <p:sp>
               <p:nvSpPr>
                 <p:cNvPr id="19" name="TextBox 18">
@@ -6163,7 +6103,7 @@
               </p:txBody>
             </p:sp>
           </mc:Choice>
-          <mc:Fallback>
+          <mc:Fallback xmlns="">
             <p:sp>
               <p:nvSpPr>
                 <p:cNvPr id="19" name="TextBox 18">
@@ -6284,8 +6224,8 @@
             </a:p>
           </p:txBody>
         </p:sp>
-        <mc:AlternateContent xmlns:mc="http://schemas.openxmlformats.org/markup-compatibility/2006">
-          <mc:Choice xmlns:a14="http://schemas.microsoft.com/office/drawing/2010/main" Requires="a14">
+        <mc:AlternateContent xmlns:mc="http://schemas.openxmlformats.org/markup-compatibility/2006" xmlns:a14="http://schemas.microsoft.com/office/drawing/2010/main">
+          <mc:Choice Requires="a14">
             <p:sp>
               <p:nvSpPr>
                 <p:cNvPr id="22" name="TextBox 21">
@@ -6344,7 +6284,7 @@
               </p:txBody>
             </p:sp>
           </mc:Choice>
-          <mc:Fallback>
+          <mc:Fallback xmlns="">
             <p:sp>
               <p:nvSpPr>
                 <p:cNvPr id="22" name="TextBox 21">
@@ -6580,8 +6520,8 @@
             </a:p>
           </p:txBody>
         </p:sp>
-        <mc:AlternateContent xmlns:mc="http://schemas.openxmlformats.org/markup-compatibility/2006">
-          <mc:Choice xmlns:a14="http://schemas.microsoft.com/office/drawing/2010/main" Requires="a14">
+        <mc:AlternateContent xmlns:mc="http://schemas.openxmlformats.org/markup-compatibility/2006" xmlns:a14="http://schemas.microsoft.com/office/drawing/2010/main">
+          <mc:Choice Requires="a14">
             <p:sp>
               <p:nvSpPr>
                 <p:cNvPr id="27" name="TextBox 26">
@@ -6666,7 +6606,7 @@
               </p:txBody>
             </p:sp>
           </mc:Choice>
-          <mc:Fallback>
+          <mc:Fallback xmlns="">
             <p:sp>
               <p:nvSpPr>
                 <p:cNvPr id="27" name="TextBox 26">
@@ -6818,77 +6758,17 @@
                 <a:lstStyle/>
                 <a:p>
                   <a:pPr algn="ctr"/>
+                  <a:r>
+                    <a:rPr lang="en-US" sz="2000" dirty="0">
+                      <a:latin typeface="Source Sans Pro" panose="020F0502020204030204" pitchFamily="34" charset="0"/>
+                      <a:ea typeface="Source Sans Pro" panose="020F0502020204030204" pitchFamily="34" charset="0"/>
+                    </a:rPr>
+                    <a:t>Lost lepton </a:t>
+                  </a:r>
                   <a14:m>
                     <m:oMath xmlns:m="http://schemas.openxmlformats.org/officeDocument/2006/math">
                       <m:r>
-                        <a:rPr lang="en-GB" sz="2000" b="0" i="1" smtClean="0">
-                          <a:latin typeface="Cambria Math" panose="02040503050406030204" pitchFamily="18" charset="0"/>
-                          <a:ea typeface="Source Sans Pro" panose="020F0502020204030204" pitchFamily="34" charset="0"/>
-                        </a:rPr>
-                        <m:t>𝑊</m:t>
-                      </m:r>
-                      <m:d>
-                        <m:dPr>
-                          <m:ctrlPr>
-                            <a:rPr lang="en-GB" sz="2000" b="0" i="1" smtClean="0">
-                              <a:latin typeface="Cambria Math" panose="02040503050406030204" pitchFamily="18" charset="0"/>
-                              <a:ea typeface="Source Sans Pro" panose="020F0502020204030204" pitchFamily="34" charset="0"/>
-                            </a:rPr>
-                          </m:ctrlPr>
-                        </m:dPr>
-                        <m:e>
-                          <m:r>
-                            <a:rPr lang="en-GB" sz="2000" b="0" i="1" smtClean="0">
-                              <a:latin typeface="Cambria Math" panose="02040503050406030204" pitchFamily="18" charset="0"/>
-                              <a:ea typeface="Cambria Math" panose="02040503050406030204" pitchFamily="18" charset="0"/>
-                            </a:rPr>
-                            <m:t>→ℓ</m:t>
-                          </m:r>
-                          <m:r>
-                            <a:rPr lang="en-GB" sz="2000" b="0" i="1" smtClean="0">
-                              <a:latin typeface="Cambria Math" panose="02040503050406030204" pitchFamily="18" charset="0"/>
-                              <a:ea typeface="Cambria Math" panose="02040503050406030204" pitchFamily="18" charset="0"/>
-                            </a:rPr>
-                            <m:t>𝜐</m:t>
-                          </m:r>
-                        </m:e>
-                      </m:d>
-                      <m:r>
-                        <a:rPr lang="en-GB" sz="2000" b="0" i="1" smtClean="0">
-                          <a:latin typeface="Cambria Math" panose="02040503050406030204" pitchFamily="18" charset="0"/>
-                          <a:ea typeface="Cambria Math" panose="02040503050406030204" pitchFamily="18" charset="0"/>
-                        </a:rPr>
-                        <m:t>/</m:t>
-                      </m:r>
-                      <m:r>
-                        <a:rPr lang="en-GB" sz="2000" b="0" i="1" smtClean="0">
-                          <a:latin typeface="Cambria Math" panose="02040503050406030204" pitchFamily="18" charset="0"/>
-                          <a:ea typeface="Cambria Math" panose="02040503050406030204" pitchFamily="18" charset="0"/>
-                        </a:rPr>
-                        <m:t>𝑡</m:t>
-                      </m:r>
-                      <m:acc>
-                        <m:accPr>
-                          <m:chr m:val="̅"/>
-                          <m:ctrlPr>
-                            <a:rPr lang="en-GB" sz="2000" b="0" i="1" smtClean="0">
-                              <a:latin typeface="Cambria Math" panose="02040503050406030204" pitchFamily="18" charset="0"/>
-                              <a:ea typeface="Cambria Math" panose="02040503050406030204" pitchFamily="18" charset="0"/>
-                            </a:rPr>
-                          </m:ctrlPr>
-                        </m:accPr>
-                        <m:e>
-                          <m:r>
-                            <a:rPr lang="en-GB" sz="2000" b="0" i="1" smtClean="0">
-                              <a:latin typeface="Cambria Math" panose="02040503050406030204" pitchFamily="18" charset="0"/>
-                              <a:ea typeface="Cambria Math" panose="02040503050406030204" pitchFamily="18" charset="0"/>
-                            </a:rPr>
-                            <m:t>𝑡</m:t>
-                          </m:r>
-                        </m:e>
-                      </m:acc>
-                      <m:r>
-                        <a:rPr lang="en-GB" sz="2000" b="0" i="1" smtClean="0">
+                        <a:rPr lang="en-GB" sz="2000" i="1">
                           <a:latin typeface="Cambria Math" panose="02040503050406030204" pitchFamily="18" charset="0"/>
                           <a:ea typeface="Cambria Math" panose="02040503050406030204" pitchFamily="18" charset="0"/>
                         </a:rPr>
@@ -6933,7 +6813,7 @@
                 <a:blipFill>
                   <a:blip r:embed="rId8"/>
                   <a:stretch>
-                    <a:fillRect t="-9375" r="-1676" b="-28125"/>
+                    <a:fillRect t="-9375" b="-28125"/>
                   </a:stretch>
                 </a:blipFill>
               </p:spPr>

</xml_diff>